<commit_message>
Parte 1 e 3 da apresentação feita
</commit_message>
<xml_diff>
--- a/Lab03-PresentationTemplate.pptx
+++ b/Lab03-PresentationTemplate.pptx
@@ -5,24 +5,27 @@
     <p:sldMasterId id="2147483648" r:id="rId1"/>
   </p:sldMasterIdLst>
   <p:notesMasterIdLst>
-    <p:notesMasterId r:id="rId14"/>
+    <p:notesMasterId r:id="rId17"/>
   </p:notesMasterIdLst>
   <p:handoutMasterIdLst>
-    <p:handoutMasterId r:id="rId15"/>
+    <p:handoutMasterId r:id="rId18"/>
   </p:handoutMasterIdLst>
   <p:sldIdLst>
     <p:sldId id="256" r:id="rId2"/>
     <p:sldId id="257" r:id="rId3"/>
     <p:sldId id="1096" r:id="rId4"/>
-    <p:sldId id="1097" r:id="rId5"/>
-    <p:sldId id="1098" r:id="rId6"/>
-    <p:sldId id="1105" r:id="rId7"/>
-    <p:sldId id="1099" r:id="rId8"/>
-    <p:sldId id="1100" r:id="rId9"/>
-    <p:sldId id="1101" r:id="rId10"/>
-    <p:sldId id="1102" r:id="rId11"/>
-    <p:sldId id="1103" r:id="rId12"/>
-    <p:sldId id="1104" r:id="rId13"/>
+    <p:sldId id="1108" r:id="rId5"/>
+    <p:sldId id="1109" r:id="rId6"/>
+    <p:sldId id="1110" r:id="rId7"/>
+    <p:sldId id="1097" r:id="rId8"/>
+    <p:sldId id="1098" r:id="rId9"/>
+    <p:sldId id="1105" r:id="rId10"/>
+    <p:sldId id="1099" r:id="rId11"/>
+    <p:sldId id="1100" r:id="rId12"/>
+    <p:sldId id="1101" r:id="rId13"/>
+    <p:sldId id="1102" r:id="rId14"/>
+    <p:sldId id="1103" r:id="rId15"/>
+    <p:sldId id="1104" r:id="rId16"/>
   </p:sldIdLst>
   <p:sldSz cx="9144000" cy="6858000" type="screen4x3"/>
   <p:notesSz cx="6858000" cy="9144000"/>
@@ -123,7 +126,7 @@
   </p:defaultTextStyle>
   <p:extLst>
     <p:ext uri="{EFAFB233-063F-42B5-8137-9DF3F51BA10A}">
-      <p15:sldGuideLst xmlns:p15="http://schemas.microsoft.com/office/powerpoint/2012/main" xmlns="">
+      <p15:sldGuideLst xmlns="" xmlns:p15="http://schemas.microsoft.com/office/powerpoint/2012/main">
         <p15:guide id="1" orient="horz" pos="2160">
           <p15:clr>
             <a:srgbClr val="A4A3A4"/>
@@ -810,7 +813,7 @@
             <a:fld id="{F535F173-C1DD-4975-94BF-5B9ED67F7674}" type="slidenum">
               <a:rPr lang="en-US" smtClean="0"/>
               <a:pPr/>
-              <a:t>5</a:t>
+              <a:t>4</a:t>
             </a:fld>
             <a:endParaRPr lang="en-US"/>
           </a:p>
@@ -895,7 +898,7 @@
             <a:fld id="{F535F173-C1DD-4975-94BF-5B9ED67F7674}" type="slidenum">
               <a:rPr lang="en-US" smtClean="0"/>
               <a:pPr/>
-              <a:t>6</a:t>
+              <a:t>5</a:t>
             </a:fld>
             <a:endParaRPr lang="en-US"/>
           </a:p>
@@ -980,7 +983,7 @@
             <a:fld id="{F535F173-C1DD-4975-94BF-5B9ED67F7674}" type="slidenum">
               <a:rPr lang="en-US" smtClean="0"/>
               <a:pPr/>
-              <a:t>8</a:t>
+              <a:t>6</a:t>
             </a:fld>
             <a:endParaRPr lang="en-US"/>
           </a:p>
@@ -1065,7 +1068,7 @@
             <a:fld id="{F535F173-C1DD-4975-94BF-5B9ED67F7674}" type="slidenum">
               <a:rPr lang="en-US" smtClean="0"/>
               <a:pPr/>
-              <a:t>10</a:t>
+              <a:t>8</a:t>
             </a:fld>
             <a:endParaRPr lang="en-US"/>
           </a:p>
@@ -1150,7 +1153,262 @@
             <a:fld id="{F535F173-C1DD-4975-94BF-5B9ED67F7674}" type="slidenum">
               <a:rPr lang="en-US" smtClean="0"/>
               <a:pPr/>
-              <a:t>12</a:t>
+              <a:t>9</a:t>
+            </a:fld>
+            <a:endParaRPr lang="en-US"/>
+          </a:p>
+        </p:txBody>
+      </p:sp>
+    </p:spTree>
+    <p:extLst>
+      <p:ext uri="{BB962C8B-B14F-4D97-AF65-F5344CB8AC3E}">
+        <p14:creationId xmlns:p14="http://schemas.microsoft.com/office/powerpoint/2010/main" val="1355792998"/>
+      </p:ext>
+    </p:extLst>
+  </p:cSld>
+  <p:clrMapOvr>
+    <a:masterClrMapping/>
+  </p:clrMapOvr>
+</p:notes>
+</file>
+
+<file path=ppt/notesSlides/notesSlide7.xml><?xml version="1.0" encoding="utf-8"?>
+<p:notes xmlns:a="http://schemas.openxmlformats.org/drawingml/2006/main" xmlns:r="http://schemas.openxmlformats.org/officeDocument/2006/relationships" xmlns:p="http://schemas.openxmlformats.org/presentationml/2006/main">
+  <p:cSld>
+    <p:spTree>
+      <p:nvGrpSpPr>
+        <p:cNvPr id="1" name=""/>
+        <p:cNvGrpSpPr/>
+        <p:nvPr/>
+      </p:nvGrpSpPr>
+      <p:grpSpPr>
+        <a:xfrm>
+          <a:off x="0" y="0"/>
+          <a:ext cx="0" cy="0"/>
+          <a:chOff x="0" y="0"/>
+          <a:chExt cx="0" cy="0"/>
+        </a:xfrm>
+      </p:grpSpPr>
+      <p:sp>
+        <p:nvSpPr>
+          <p:cNvPr id="2" name="Slide Image Placeholder 1"/>
+          <p:cNvSpPr>
+            <a:spLocks noGrp="1" noRot="1" noChangeAspect="1"/>
+          </p:cNvSpPr>
+          <p:nvPr>
+            <p:ph type="sldImg"/>
+          </p:nvPr>
+        </p:nvSpPr>
+        <p:spPr/>
+      </p:sp>
+      <p:sp>
+        <p:nvSpPr>
+          <p:cNvPr id="3" name="Notes Placeholder 2"/>
+          <p:cNvSpPr>
+            <a:spLocks noGrp="1"/>
+          </p:cNvSpPr>
+          <p:nvPr>
+            <p:ph type="body" idx="1"/>
+          </p:nvPr>
+        </p:nvSpPr>
+        <p:spPr/>
+        <p:txBody>
+          <a:bodyPr/>
+          <a:lstStyle/>
+          <a:p>
+            <a:endParaRPr lang="en-US" baseline="0" dirty="0" smtClean="0"/>
+          </a:p>
+        </p:txBody>
+      </p:sp>
+      <p:sp>
+        <p:nvSpPr>
+          <p:cNvPr id="4" name="Slide Number Placeholder 3"/>
+          <p:cNvSpPr>
+            <a:spLocks noGrp="1"/>
+          </p:cNvSpPr>
+          <p:nvPr>
+            <p:ph type="sldNum" sz="quarter" idx="10"/>
+          </p:nvPr>
+        </p:nvSpPr>
+        <p:spPr/>
+        <p:txBody>
+          <a:bodyPr/>
+          <a:lstStyle/>
+          <a:p>
+            <a:fld id="{F535F173-C1DD-4975-94BF-5B9ED67F7674}" type="slidenum">
+              <a:rPr lang="en-US" smtClean="0"/>
+              <a:pPr/>
+              <a:t>11</a:t>
+            </a:fld>
+            <a:endParaRPr lang="en-US"/>
+          </a:p>
+        </p:txBody>
+      </p:sp>
+    </p:spTree>
+    <p:extLst>
+      <p:ext uri="{BB962C8B-B14F-4D97-AF65-F5344CB8AC3E}">
+        <p14:creationId xmlns:p14="http://schemas.microsoft.com/office/powerpoint/2010/main" val="1355792998"/>
+      </p:ext>
+    </p:extLst>
+  </p:cSld>
+  <p:clrMapOvr>
+    <a:masterClrMapping/>
+  </p:clrMapOvr>
+</p:notes>
+</file>
+
+<file path=ppt/notesSlides/notesSlide8.xml><?xml version="1.0" encoding="utf-8"?>
+<p:notes xmlns:a="http://schemas.openxmlformats.org/drawingml/2006/main" xmlns:r="http://schemas.openxmlformats.org/officeDocument/2006/relationships" xmlns:p="http://schemas.openxmlformats.org/presentationml/2006/main">
+  <p:cSld>
+    <p:spTree>
+      <p:nvGrpSpPr>
+        <p:cNvPr id="1" name=""/>
+        <p:cNvGrpSpPr/>
+        <p:nvPr/>
+      </p:nvGrpSpPr>
+      <p:grpSpPr>
+        <a:xfrm>
+          <a:off x="0" y="0"/>
+          <a:ext cx="0" cy="0"/>
+          <a:chOff x="0" y="0"/>
+          <a:chExt cx="0" cy="0"/>
+        </a:xfrm>
+      </p:grpSpPr>
+      <p:sp>
+        <p:nvSpPr>
+          <p:cNvPr id="2" name="Slide Image Placeholder 1"/>
+          <p:cNvSpPr>
+            <a:spLocks noGrp="1" noRot="1" noChangeAspect="1"/>
+          </p:cNvSpPr>
+          <p:nvPr>
+            <p:ph type="sldImg"/>
+          </p:nvPr>
+        </p:nvSpPr>
+        <p:spPr/>
+      </p:sp>
+      <p:sp>
+        <p:nvSpPr>
+          <p:cNvPr id="3" name="Notes Placeholder 2"/>
+          <p:cNvSpPr>
+            <a:spLocks noGrp="1"/>
+          </p:cNvSpPr>
+          <p:nvPr>
+            <p:ph type="body" idx="1"/>
+          </p:nvPr>
+        </p:nvSpPr>
+        <p:spPr/>
+        <p:txBody>
+          <a:bodyPr/>
+          <a:lstStyle/>
+          <a:p>
+            <a:endParaRPr lang="en-US" baseline="0" dirty="0" smtClean="0"/>
+          </a:p>
+        </p:txBody>
+      </p:sp>
+      <p:sp>
+        <p:nvSpPr>
+          <p:cNvPr id="4" name="Slide Number Placeholder 3"/>
+          <p:cNvSpPr>
+            <a:spLocks noGrp="1"/>
+          </p:cNvSpPr>
+          <p:nvPr>
+            <p:ph type="sldNum" sz="quarter" idx="10"/>
+          </p:nvPr>
+        </p:nvSpPr>
+        <p:spPr/>
+        <p:txBody>
+          <a:bodyPr/>
+          <a:lstStyle/>
+          <a:p>
+            <a:fld id="{F535F173-C1DD-4975-94BF-5B9ED67F7674}" type="slidenum">
+              <a:rPr lang="en-US" smtClean="0"/>
+              <a:pPr/>
+              <a:t>13</a:t>
+            </a:fld>
+            <a:endParaRPr lang="en-US"/>
+          </a:p>
+        </p:txBody>
+      </p:sp>
+    </p:spTree>
+    <p:extLst>
+      <p:ext uri="{BB962C8B-B14F-4D97-AF65-F5344CB8AC3E}">
+        <p14:creationId xmlns:p14="http://schemas.microsoft.com/office/powerpoint/2010/main" val="1355792998"/>
+      </p:ext>
+    </p:extLst>
+  </p:cSld>
+  <p:clrMapOvr>
+    <a:masterClrMapping/>
+  </p:clrMapOvr>
+</p:notes>
+</file>
+
+<file path=ppt/notesSlides/notesSlide9.xml><?xml version="1.0" encoding="utf-8"?>
+<p:notes xmlns:a="http://schemas.openxmlformats.org/drawingml/2006/main" xmlns:r="http://schemas.openxmlformats.org/officeDocument/2006/relationships" xmlns:p="http://schemas.openxmlformats.org/presentationml/2006/main">
+  <p:cSld>
+    <p:spTree>
+      <p:nvGrpSpPr>
+        <p:cNvPr id="1" name=""/>
+        <p:cNvGrpSpPr/>
+        <p:nvPr/>
+      </p:nvGrpSpPr>
+      <p:grpSpPr>
+        <a:xfrm>
+          <a:off x="0" y="0"/>
+          <a:ext cx="0" cy="0"/>
+          <a:chOff x="0" y="0"/>
+          <a:chExt cx="0" cy="0"/>
+        </a:xfrm>
+      </p:grpSpPr>
+      <p:sp>
+        <p:nvSpPr>
+          <p:cNvPr id="2" name="Slide Image Placeholder 1"/>
+          <p:cNvSpPr>
+            <a:spLocks noGrp="1" noRot="1" noChangeAspect="1"/>
+          </p:cNvSpPr>
+          <p:nvPr>
+            <p:ph type="sldImg"/>
+          </p:nvPr>
+        </p:nvSpPr>
+        <p:spPr/>
+      </p:sp>
+      <p:sp>
+        <p:nvSpPr>
+          <p:cNvPr id="3" name="Notes Placeholder 2"/>
+          <p:cNvSpPr>
+            <a:spLocks noGrp="1"/>
+          </p:cNvSpPr>
+          <p:nvPr>
+            <p:ph type="body" idx="1"/>
+          </p:nvPr>
+        </p:nvSpPr>
+        <p:spPr/>
+        <p:txBody>
+          <a:bodyPr/>
+          <a:lstStyle/>
+          <a:p>
+            <a:endParaRPr lang="en-US" baseline="0" dirty="0" smtClean="0"/>
+          </a:p>
+        </p:txBody>
+      </p:sp>
+      <p:sp>
+        <p:nvSpPr>
+          <p:cNvPr id="4" name="Slide Number Placeholder 3"/>
+          <p:cNvSpPr>
+            <a:spLocks noGrp="1"/>
+          </p:cNvSpPr>
+          <p:nvPr>
+            <p:ph type="sldNum" sz="quarter" idx="10"/>
+          </p:nvPr>
+        </p:nvSpPr>
+        <p:spPr/>
+        <p:txBody>
+          <a:bodyPr/>
+          <a:lstStyle/>
+          <a:p>
+            <a:fld id="{F535F173-C1DD-4975-94BF-5B9ED67F7674}" type="slidenum">
+              <a:rPr lang="en-US" smtClean="0"/>
+              <a:pPr/>
+              <a:t>15</a:t>
             </a:fld>
             <a:endParaRPr lang="en-US"/>
           </a:p>
@@ -3465,11 +3723,6 @@
               </a:rPr>
               <a:t>G01-A</a:t>
             </a:r>
-            <a:endParaRPr lang="pt-PT" sz="4600" dirty="0" smtClean="0">
-              <a:solidFill>
-                <a:schemeClr val="bg2"/>
-              </a:solidFill>
-            </a:endParaRPr>
           </a:p>
         </p:txBody>
       </p:sp>
@@ -3713,97 +3966,86 @@
       </p:grpSpPr>
       <p:sp>
         <p:nvSpPr>
-          <p:cNvPr id="2" name="Title 1"/>
+          <p:cNvPr id="6" name="Text Placeholder 5"/>
+          <p:cNvSpPr>
+            <a:spLocks noGrp="1"/>
+          </p:cNvSpPr>
+          <p:nvPr>
+            <p:ph type="body" sz="quarter" idx="11"/>
+          </p:nvPr>
+        </p:nvSpPr>
+        <p:spPr/>
+        <p:txBody>
+          <a:bodyPr/>
+          <a:lstStyle/>
+          <a:p>
+            <a:endParaRPr lang="en-US" dirty="0"/>
+          </a:p>
+        </p:txBody>
+      </p:sp>
+      <p:sp>
+        <p:nvSpPr>
+          <p:cNvPr id="29" name="Text Placeholder 28"/>
+          <p:cNvSpPr>
+            <a:spLocks noGrp="1"/>
+          </p:cNvSpPr>
+          <p:nvPr>
+            <p:ph type="body" sz="quarter" idx="10"/>
+          </p:nvPr>
+        </p:nvSpPr>
+        <p:spPr/>
+        <p:txBody>
+          <a:bodyPr/>
+          <a:lstStyle/>
+          <a:p>
+            <a:r>
+              <a:rPr lang="pt-PT" sz="16600" dirty="0" smtClean="0"/>
+              <a:t>03</a:t>
+            </a:r>
+            <a:endParaRPr lang="pt-PT" sz="16600" dirty="0"/>
+          </a:p>
+        </p:txBody>
+      </p:sp>
+      <p:sp>
+        <p:nvSpPr>
+          <p:cNvPr id="4" name="Title 3"/>
           <p:cNvSpPr>
             <a:spLocks noGrp="1"/>
           </p:cNvSpPr>
           <p:nvPr>
             <p:ph type="title"/>
-          </p:nvPr>
-        </p:nvSpPr>
-        <p:spPr/>
-        <p:txBody>
-          <a:bodyPr/>
-          <a:lstStyle/>
-          <a:p>
-            <a:r>
-              <a:rPr lang="en-US" dirty="0" smtClean="0"/>
-              <a:t>Questions</a:t>
-            </a:r>
-            <a:endParaRPr lang="pt-PT" dirty="0"/>
-          </a:p>
-        </p:txBody>
-      </p:sp>
-      <p:sp>
-        <p:nvSpPr>
-          <p:cNvPr id="3" name="Content Placeholder 2"/>
-          <p:cNvSpPr>
-            <a:spLocks noGrp="1"/>
-          </p:cNvSpPr>
-          <p:nvPr>
-            <p:ph idx="1"/>
           </p:nvPr>
         </p:nvSpPr>
         <p:spPr>
           <a:xfrm>
-            <a:off x="457200" y="1094346"/>
-            <a:ext cx="8229600" cy="5214974"/>
+            <a:off x="2281222" y="3214686"/>
+            <a:ext cx="6786578" cy="3033714"/>
           </a:xfrm>
+          <a:solidFill>
+            <a:srgbClr val="FFFFFF">
+              <a:alpha val="80000"/>
+            </a:srgbClr>
+          </a:solidFill>
         </p:spPr>
         <p:txBody>
-          <a:bodyPr>
+          <a:bodyPr rIns="288000">
             <a:noAutofit/>
           </a:bodyPr>
           <a:lstStyle/>
           <a:p>
-            <a:r>
-              <a:rPr lang="en-US" sz="4000" dirty="0" smtClean="0"/>
-              <a:t>Question 1</a:t>
-            </a:r>
-          </a:p>
-          <a:p>
-            <a:r>
-              <a:rPr lang="en-US" sz="4000" dirty="0" smtClean="0"/>
-              <a:t>Question 2</a:t>
-            </a:r>
-            <a:endParaRPr lang="en-US" sz="4000" dirty="0"/>
-          </a:p>
-          <a:p>
-            <a:r>
-              <a:rPr lang="en-US" sz="4000" dirty="0" smtClean="0"/>
-              <a:t>Question 3</a:t>
-            </a:r>
-          </a:p>
-          <a:p>
-            <a:r>
-              <a:rPr lang="en-US" sz="4000" dirty="0"/>
-              <a:t>Question 4</a:t>
-            </a:r>
-            <a:endParaRPr lang="en-US" sz="4000" dirty="0" smtClean="0"/>
-          </a:p>
-          <a:p>
-            <a:r>
-              <a:rPr lang="en-US" sz="4000" dirty="0"/>
-              <a:t>Question </a:t>
-            </a:r>
-            <a:r>
-              <a:rPr lang="en-US" sz="4000" dirty="0" smtClean="0"/>
-              <a:t>5</a:t>
-            </a:r>
-            <a:endParaRPr lang="en-US" sz="4000" dirty="0"/>
-          </a:p>
-          <a:p>
-            <a:endParaRPr lang="en-US" sz="4000" dirty="0" smtClean="0"/>
-          </a:p>
-          <a:p>
-            <a:endParaRPr lang="en-US" sz="4000" dirty="0"/>
+            <a:pPr marL="0" algn="r"/>
+            <a:r>
+              <a:rPr lang="pt-PT" sz="6000" dirty="0" smtClean="0"/>
+              <a:t>TASKS</a:t>
+            </a:r>
+            <a:endParaRPr lang="pt-PT" sz="6000" dirty="0"/>
           </a:p>
         </p:txBody>
       </p:sp>
     </p:spTree>
     <p:extLst>
       <p:ext uri="{BB962C8B-B14F-4D97-AF65-F5344CB8AC3E}">
-        <p14:creationId xmlns:p14="http://schemas.microsoft.com/office/powerpoint/2010/main" val="3456915046"/>
+        <p14:creationId xmlns:p14="http://schemas.microsoft.com/office/powerpoint/2010/main" val="760072998"/>
       </p:ext>
     </p:extLst>
   </p:cSld>
@@ -3839,6 +4081,403 @@
       </p:grpSpPr>
       <p:sp>
         <p:nvSpPr>
+          <p:cNvPr id="2" name="Title 1"/>
+          <p:cNvSpPr>
+            <a:spLocks noGrp="1"/>
+          </p:cNvSpPr>
+          <p:nvPr>
+            <p:ph type="title"/>
+          </p:nvPr>
+        </p:nvSpPr>
+        <p:spPr/>
+        <p:txBody>
+          <a:bodyPr/>
+          <a:lstStyle/>
+          <a:p>
+            <a:r>
+              <a:rPr lang="en-US" dirty="0" smtClean="0"/>
+              <a:t>Tasks</a:t>
+            </a:r>
+            <a:endParaRPr lang="pt-PT" dirty="0"/>
+          </a:p>
+        </p:txBody>
+      </p:sp>
+      <p:sp>
+        <p:nvSpPr>
+          <p:cNvPr id="3" name="Content Placeholder 2"/>
+          <p:cNvSpPr>
+            <a:spLocks noGrp="1"/>
+          </p:cNvSpPr>
+          <p:nvPr>
+            <p:ph idx="1"/>
+          </p:nvPr>
+        </p:nvSpPr>
+        <p:spPr>
+          <a:xfrm>
+            <a:off x="457200" y="1094346"/>
+            <a:ext cx="8229600" cy="5214974"/>
+          </a:xfrm>
+        </p:spPr>
+        <p:txBody>
+          <a:bodyPr>
+            <a:noAutofit/>
+          </a:bodyPr>
+          <a:lstStyle/>
+          <a:p>
+            <a:r>
+              <a:rPr lang="en-US" sz="3600" dirty="0" smtClean="0"/>
+              <a:t>Task </a:t>
+            </a:r>
+            <a:r>
+              <a:rPr lang="en-US" sz="3600" dirty="0" smtClean="0"/>
+              <a:t>1 – Browse</a:t>
+            </a:r>
+            <a:endParaRPr lang="en-US" sz="3600" dirty="0" smtClean="0"/>
+          </a:p>
+          <a:p>
+            <a:pPr lvl="1"/>
+            <a:r>
+              <a:rPr lang="en-US" sz="3200" dirty="0" smtClean="0"/>
+              <a:t>“Show a list of the countries with the most gold medalists, in total, in a given year”</a:t>
+            </a:r>
+            <a:endParaRPr lang="en-US" sz="3200" dirty="0" smtClean="0"/>
+          </a:p>
+          <a:p>
+            <a:r>
+              <a:rPr lang="en-US" sz="3600" dirty="0"/>
+              <a:t>Task </a:t>
+            </a:r>
+            <a:r>
+              <a:rPr lang="en-US" sz="3600" dirty="0" smtClean="0"/>
+              <a:t>2 – Identify</a:t>
+            </a:r>
+            <a:endParaRPr lang="en-US" sz="3600" dirty="0"/>
+          </a:p>
+          <a:p>
+            <a:pPr lvl="1"/>
+            <a:r>
+              <a:rPr lang="en-US" sz="3200" dirty="0" smtClean="0"/>
+              <a:t>“Show the country with the most medalists in Judo of all time”</a:t>
+            </a:r>
+            <a:endParaRPr lang="en-US" sz="2400" dirty="0"/>
+          </a:p>
+          <a:p>
+            <a:r>
+              <a:rPr lang="en-US" sz="3600" dirty="0"/>
+              <a:t>Task </a:t>
+            </a:r>
+            <a:r>
+              <a:rPr lang="en-US" sz="3600" dirty="0" smtClean="0"/>
+              <a:t>3</a:t>
+            </a:r>
+            <a:r>
+              <a:rPr lang="en-US" sz="3600" dirty="0"/>
+              <a:t> </a:t>
+            </a:r>
+            <a:r>
+              <a:rPr lang="en-US" sz="3600" dirty="0" smtClean="0"/>
+              <a:t>- Locate</a:t>
+            </a:r>
+            <a:endParaRPr lang="en-US" sz="3200" dirty="0"/>
+          </a:p>
+          <a:p>
+            <a:pPr lvl="1"/>
+            <a:r>
+              <a:rPr lang="en-US" sz="3200" dirty="0" smtClean="0"/>
+              <a:t>“Show the position of the country in th</a:t>
+            </a:r>
+            <a:r>
+              <a:rPr lang="en-US" sz="3200" dirty="0" smtClean="0"/>
+              <a:t>e overall standings”</a:t>
+            </a:r>
+            <a:endParaRPr lang="en-US" sz="2400" dirty="0"/>
+          </a:p>
+        </p:txBody>
+      </p:sp>
+    </p:spTree>
+    <p:extLst>
+      <p:ext uri="{BB962C8B-B14F-4D97-AF65-F5344CB8AC3E}">
+        <p14:creationId xmlns:p14="http://schemas.microsoft.com/office/powerpoint/2010/main" val="1967416131"/>
+      </p:ext>
+    </p:extLst>
+  </p:cSld>
+  <p:clrMapOvr>
+    <a:masterClrMapping/>
+  </p:clrMapOvr>
+  <p:timing>
+    <p:tnLst>
+      <p:par>
+        <p:cTn id="1" dur="indefinite" restart="never" nodeType="tmRoot"/>
+      </p:par>
+    </p:tnLst>
+  </p:timing>
+</p:sld>
+</file>
+
+<file path=ppt/slides/slide12.xml><?xml version="1.0" encoding="utf-8"?>
+<p:sld xmlns:a="http://schemas.openxmlformats.org/drawingml/2006/main" xmlns:r="http://schemas.openxmlformats.org/officeDocument/2006/relationships" xmlns:p="http://schemas.openxmlformats.org/presentationml/2006/main">
+  <p:cSld>
+    <p:spTree>
+      <p:nvGrpSpPr>
+        <p:cNvPr id="1" name=""/>
+        <p:cNvGrpSpPr/>
+        <p:nvPr/>
+      </p:nvGrpSpPr>
+      <p:grpSpPr>
+        <a:xfrm>
+          <a:off x="0" y="0"/>
+          <a:ext cx="0" cy="0"/>
+          <a:chOff x="0" y="0"/>
+          <a:chExt cx="0" cy="0"/>
+        </a:xfrm>
+      </p:grpSpPr>
+      <p:sp>
+        <p:nvSpPr>
+          <p:cNvPr id="6" name="Text Placeholder 5"/>
+          <p:cNvSpPr>
+            <a:spLocks noGrp="1"/>
+          </p:cNvSpPr>
+          <p:nvPr>
+            <p:ph type="body" sz="quarter" idx="11"/>
+          </p:nvPr>
+        </p:nvSpPr>
+        <p:spPr/>
+        <p:txBody>
+          <a:bodyPr/>
+          <a:lstStyle/>
+          <a:p>
+            <a:endParaRPr lang="en-US" dirty="0"/>
+          </a:p>
+        </p:txBody>
+      </p:sp>
+      <p:sp>
+        <p:nvSpPr>
+          <p:cNvPr id="29" name="Text Placeholder 28"/>
+          <p:cNvSpPr>
+            <a:spLocks noGrp="1"/>
+          </p:cNvSpPr>
+          <p:nvPr>
+            <p:ph type="body" sz="quarter" idx="10"/>
+          </p:nvPr>
+        </p:nvSpPr>
+        <p:spPr/>
+        <p:txBody>
+          <a:bodyPr/>
+          <a:lstStyle/>
+          <a:p>
+            <a:r>
+              <a:rPr lang="pt-PT" sz="16600" dirty="0" smtClean="0"/>
+              <a:t>04</a:t>
+            </a:r>
+            <a:endParaRPr lang="pt-PT" sz="16600" dirty="0"/>
+          </a:p>
+        </p:txBody>
+      </p:sp>
+      <p:sp>
+        <p:nvSpPr>
+          <p:cNvPr id="4" name="Title 3"/>
+          <p:cNvSpPr>
+            <a:spLocks noGrp="1"/>
+          </p:cNvSpPr>
+          <p:nvPr>
+            <p:ph type="title"/>
+          </p:nvPr>
+        </p:nvSpPr>
+        <p:spPr>
+          <a:xfrm>
+            <a:off x="2281222" y="3214686"/>
+            <a:ext cx="6786578" cy="3033714"/>
+          </a:xfrm>
+          <a:solidFill>
+            <a:srgbClr val="FFFFFF">
+              <a:alpha val="80000"/>
+            </a:srgbClr>
+          </a:solidFill>
+        </p:spPr>
+        <p:txBody>
+          <a:bodyPr rIns="288000">
+            <a:noAutofit/>
+          </a:bodyPr>
+          <a:lstStyle/>
+          <a:p>
+            <a:pPr marL="0" algn="r"/>
+            <a:r>
+              <a:rPr lang="pt-PT" sz="6000" dirty="0" err="1" smtClean="0"/>
+              <a:t>Example</a:t>
+            </a:r>
+            <a:r>
+              <a:rPr lang="pt-PT" sz="6000" dirty="0" smtClean="0"/>
+              <a:t> QUESTIONS</a:t>
+            </a:r>
+            <a:endParaRPr lang="pt-PT" sz="6000" dirty="0"/>
+          </a:p>
+        </p:txBody>
+      </p:sp>
+    </p:spTree>
+    <p:extLst>
+      <p:ext uri="{BB962C8B-B14F-4D97-AF65-F5344CB8AC3E}">
+        <p14:creationId xmlns:p14="http://schemas.microsoft.com/office/powerpoint/2010/main" val="4045494449"/>
+      </p:ext>
+    </p:extLst>
+  </p:cSld>
+  <p:clrMapOvr>
+    <a:masterClrMapping/>
+  </p:clrMapOvr>
+  <p:timing>
+    <p:tnLst>
+      <p:par>
+        <p:cTn id="1" dur="indefinite" restart="never" nodeType="tmRoot"/>
+      </p:par>
+    </p:tnLst>
+  </p:timing>
+</p:sld>
+</file>
+
+<file path=ppt/slides/slide13.xml><?xml version="1.0" encoding="utf-8"?>
+<p:sld xmlns:a="http://schemas.openxmlformats.org/drawingml/2006/main" xmlns:r="http://schemas.openxmlformats.org/officeDocument/2006/relationships" xmlns:p="http://schemas.openxmlformats.org/presentationml/2006/main">
+  <p:cSld>
+    <p:spTree>
+      <p:nvGrpSpPr>
+        <p:cNvPr id="1" name=""/>
+        <p:cNvGrpSpPr/>
+        <p:nvPr/>
+      </p:nvGrpSpPr>
+      <p:grpSpPr>
+        <a:xfrm>
+          <a:off x="0" y="0"/>
+          <a:ext cx="0" cy="0"/>
+          <a:chOff x="0" y="0"/>
+          <a:chExt cx="0" cy="0"/>
+        </a:xfrm>
+      </p:grpSpPr>
+      <p:sp>
+        <p:nvSpPr>
+          <p:cNvPr id="2" name="Title 1"/>
+          <p:cNvSpPr>
+            <a:spLocks noGrp="1"/>
+          </p:cNvSpPr>
+          <p:nvPr>
+            <p:ph type="title"/>
+          </p:nvPr>
+        </p:nvSpPr>
+        <p:spPr/>
+        <p:txBody>
+          <a:bodyPr/>
+          <a:lstStyle/>
+          <a:p>
+            <a:r>
+              <a:rPr lang="en-US" dirty="0" smtClean="0"/>
+              <a:t>Questions</a:t>
+            </a:r>
+            <a:endParaRPr lang="pt-PT" dirty="0"/>
+          </a:p>
+        </p:txBody>
+      </p:sp>
+      <p:sp>
+        <p:nvSpPr>
+          <p:cNvPr id="3" name="Content Placeholder 2"/>
+          <p:cNvSpPr>
+            <a:spLocks noGrp="1"/>
+          </p:cNvSpPr>
+          <p:nvPr>
+            <p:ph idx="1"/>
+          </p:nvPr>
+        </p:nvSpPr>
+        <p:spPr>
+          <a:xfrm>
+            <a:off x="457200" y="1094346"/>
+            <a:ext cx="8229600" cy="5214974"/>
+          </a:xfrm>
+        </p:spPr>
+        <p:txBody>
+          <a:bodyPr>
+            <a:noAutofit/>
+          </a:bodyPr>
+          <a:lstStyle/>
+          <a:p>
+            <a:r>
+              <a:rPr lang="en-US" sz="4000" dirty="0" smtClean="0"/>
+              <a:t>Question 1</a:t>
+            </a:r>
+          </a:p>
+          <a:p>
+            <a:r>
+              <a:rPr lang="en-US" sz="4000" dirty="0" smtClean="0"/>
+              <a:t>Question 2</a:t>
+            </a:r>
+            <a:endParaRPr lang="en-US" sz="4000" dirty="0"/>
+          </a:p>
+          <a:p>
+            <a:r>
+              <a:rPr lang="en-US" sz="4000" dirty="0" smtClean="0"/>
+              <a:t>Question 3</a:t>
+            </a:r>
+          </a:p>
+          <a:p>
+            <a:r>
+              <a:rPr lang="en-US" sz="4000" dirty="0"/>
+              <a:t>Question 4</a:t>
+            </a:r>
+            <a:endParaRPr lang="en-US" sz="4000" dirty="0" smtClean="0"/>
+          </a:p>
+          <a:p>
+            <a:r>
+              <a:rPr lang="en-US" sz="4000" dirty="0"/>
+              <a:t>Question </a:t>
+            </a:r>
+            <a:r>
+              <a:rPr lang="en-US" sz="4000" dirty="0" smtClean="0"/>
+              <a:t>5</a:t>
+            </a:r>
+            <a:endParaRPr lang="en-US" sz="4000" dirty="0"/>
+          </a:p>
+          <a:p>
+            <a:endParaRPr lang="en-US" sz="4000" dirty="0" smtClean="0"/>
+          </a:p>
+          <a:p>
+            <a:endParaRPr lang="en-US" sz="4000" dirty="0"/>
+          </a:p>
+        </p:txBody>
+      </p:sp>
+    </p:spTree>
+    <p:extLst>
+      <p:ext uri="{BB962C8B-B14F-4D97-AF65-F5344CB8AC3E}">
+        <p14:creationId xmlns:p14="http://schemas.microsoft.com/office/powerpoint/2010/main" val="3456915046"/>
+      </p:ext>
+    </p:extLst>
+  </p:cSld>
+  <p:clrMapOvr>
+    <a:masterClrMapping/>
+  </p:clrMapOvr>
+  <p:timing>
+    <p:tnLst>
+      <p:par>
+        <p:cTn id="1" dur="indefinite" restart="never" nodeType="tmRoot"/>
+      </p:par>
+    </p:tnLst>
+  </p:timing>
+</p:sld>
+</file>
+
+<file path=ppt/slides/slide14.xml><?xml version="1.0" encoding="utf-8"?>
+<p:sld xmlns:a="http://schemas.openxmlformats.org/drawingml/2006/main" xmlns:r="http://schemas.openxmlformats.org/officeDocument/2006/relationships" xmlns:p="http://schemas.openxmlformats.org/presentationml/2006/main">
+  <p:cSld>
+    <p:spTree>
+      <p:nvGrpSpPr>
+        <p:cNvPr id="1" name=""/>
+        <p:cNvGrpSpPr/>
+        <p:nvPr/>
+      </p:nvGrpSpPr>
+      <p:grpSpPr>
+        <a:xfrm>
+          <a:off x="0" y="0"/>
+          <a:ext cx="0" cy="0"/>
+          <a:chOff x="0" y="0"/>
+          <a:chExt cx="0" cy="0"/>
+        </a:xfrm>
+      </p:grpSpPr>
+      <p:sp>
+        <p:nvSpPr>
           <p:cNvPr id="6" name="Text Placeholder 5"/>
           <p:cNvSpPr>
             <a:spLocks noGrp="1"/>
@@ -3935,7 +4574,7 @@
 </p:sld>
 </file>
 
-<file path=ppt/slides/slide12.xml><?xml version="1.0" encoding="utf-8"?>
+<file path=ppt/slides/slide15.xml><?xml version="1.0" encoding="utf-8"?>
 <p:sld xmlns:a="http://schemas.openxmlformats.org/drawingml/2006/main" xmlns:r="http://schemas.openxmlformats.org/officeDocument/2006/relationships" xmlns:p="http://schemas.openxmlformats.org/presentationml/2006/main">
   <p:cSld>
     <p:spTree>
@@ -4283,26 +4922,46 @@
           <a:p>
             <a:r>
               <a:rPr lang="en-US" sz="4000" dirty="0" smtClean="0"/>
-              <a:t>High level description</a:t>
-            </a:r>
-          </a:p>
-          <a:p>
-            <a:pPr lvl="1"/>
-            <a:r>
-              <a:rPr lang="en-US" sz="3600" dirty="0" smtClean="0"/>
-              <a:t>What will you be visualizing?</a:t>
-            </a:r>
-          </a:p>
-          <a:p>
-            <a:pPr lvl="1"/>
-            <a:r>
-              <a:rPr lang="en-US" sz="3600" dirty="0" smtClean="0"/>
-              <a:t>Why is that relevant?</a:t>
-            </a:r>
-            <a:endParaRPr lang="en-US" dirty="0" smtClean="0"/>
-          </a:p>
-        </p:txBody>
-      </p:sp>
+              <a:t>High level </a:t>
+            </a:r>
+            <a:r>
+              <a:rPr lang="en-US" sz="4000" dirty="0" smtClean="0"/>
+              <a:t>description</a:t>
+            </a:r>
+            <a:endParaRPr lang="en-US" sz="4000" dirty="0" smtClean="0"/>
+          </a:p>
+        </p:txBody>
+      </p:sp>
+      <p:pic>
+        <p:nvPicPr>
+          <p:cNvPr id="4" name="Imagem 3"/>
+          <p:cNvPicPr>
+            <a:picLocks noChangeAspect="1"/>
+          </p:cNvPicPr>
+          <p:nvPr/>
+        </p:nvPicPr>
+        <p:blipFill>
+          <a:blip r:embed="rId3">
+            <a:extLst>
+              <a:ext uri="{28A0092B-C50C-407E-A947-70E740481C1C}">
+                <a14:useLocalDpi xmlns:a14="http://schemas.microsoft.com/office/drawing/2010/main" val="0"/>
+              </a:ext>
+            </a:extLst>
+          </a:blip>
+          <a:stretch>
+            <a:fillRect/>
+          </a:stretch>
+        </p:blipFill>
+        <p:spPr>
+          <a:xfrm>
+            <a:off x="1691680" y="2276872"/>
+            <a:ext cx="2592288" cy="2592288"/>
+          </a:xfrm>
+          <a:prstGeom prst="rect">
+            <a:avLst/>
+          </a:prstGeom>
+        </p:spPr>
+      </p:pic>
     </p:spTree>
     <p:extLst>
       <p:ext uri="{BB962C8B-B14F-4D97-AF65-F5344CB8AC3E}">
@@ -4342,12 +5001,12 @@
       </p:grpSpPr>
       <p:sp>
         <p:nvSpPr>
-          <p:cNvPr id="6" name="Text Placeholder 5"/>
-          <p:cNvSpPr>
-            <a:spLocks noGrp="1"/>
-          </p:cNvSpPr>
-          <p:nvPr>
-            <p:ph type="body" sz="quarter" idx="11"/>
+          <p:cNvPr id="2" name="Title 1"/>
+          <p:cNvSpPr>
+            <a:spLocks noGrp="1"/>
+          </p:cNvSpPr>
+          <p:nvPr>
+            <p:ph type="title"/>
           </p:nvPr>
         </p:nvSpPr>
         <p:spPr/>
@@ -4355,73 +5014,107 @@
           <a:bodyPr/>
           <a:lstStyle/>
           <a:p>
-            <a:endParaRPr lang="en-US" dirty="0"/>
-          </a:p>
-        </p:txBody>
-      </p:sp>
-      <p:sp>
-        <p:nvSpPr>
-          <p:cNvPr id="29" name="Text Placeholder 28"/>
-          <p:cNvSpPr>
-            <a:spLocks noGrp="1"/>
-          </p:cNvSpPr>
-          <p:nvPr>
-            <p:ph type="body" sz="quarter" idx="10"/>
+            <a:r>
+              <a:rPr lang="en-US" dirty="0" smtClean="0"/>
+              <a:t>Domain</a:t>
+            </a:r>
+            <a:endParaRPr lang="pt-PT" dirty="0"/>
+          </a:p>
+        </p:txBody>
+      </p:sp>
+      <p:sp>
+        <p:nvSpPr>
+          <p:cNvPr id="3" name="Content Placeholder 2"/>
+          <p:cNvSpPr>
+            <a:spLocks noGrp="1"/>
+          </p:cNvSpPr>
+          <p:nvPr>
+            <p:ph idx="1"/>
           </p:nvPr>
         </p:nvSpPr>
         <p:spPr/>
         <p:txBody>
-          <a:bodyPr/>
-          <a:lstStyle/>
-          <a:p>
-            <a:r>
-              <a:rPr lang="pt-PT" sz="16600" dirty="0" smtClean="0"/>
-              <a:t>02</a:t>
-            </a:r>
-            <a:endParaRPr lang="pt-PT" sz="16600" dirty="0"/>
-          </a:p>
-        </p:txBody>
-      </p:sp>
-      <p:sp>
-        <p:nvSpPr>
-          <p:cNvPr id="4" name="Title 3"/>
-          <p:cNvSpPr>
-            <a:spLocks noGrp="1"/>
-          </p:cNvSpPr>
-          <p:nvPr>
-            <p:ph type="title"/>
-          </p:nvPr>
-        </p:nvSpPr>
+          <a:bodyPr>
+            <a:noAutofit/>
+          </a:bodyPr>
+          <a:lstStyle/>
+          <a:p>
+            <a:r>
+              <a:rPr lang="en-US" sz="4000" dirty="0" smtClean="0"/>
+              <a:t>High level </a:t>
+            </a:r>
+            <a:r>
+              <a:rPr lang="en-US" sz="4000" dirty="0" smtClean="0"/>
+              <a:t>description</a:t>
+            </a:r>
+            <a:endParaRPr lang="en-US" sz="4000" dirty="0" smtClean="0"/>
+          </a:p>
+        </p:txBody>
+      </p:sp>
+      <p:pic>
+        <p:nvPicPr>
+          <p:cNvPr id="4" name="Imagem 3"/>
+          <p:cNvPicPr>
+            <a:picLocks noChangeAspect="1"/>
+          </p:cNvPicPr>
+          <p:nvPr/>
+        </p:nvPicPr>
+        <p:blipFill>
+          <a:blip r:embed="rId3">
+            <a:extLst>
+              <a:ext uri="{28A0092B-C50C-407E-A947-70E740481C1C}">
+                <a14:useLocalDpi xmlns:a14="http://schemas.microsoft.com/office/drawing/2010/main" val="0"/>
+              </a:ext>
+            </a:extLst>
+          </a:blip>
+          <a:stretch>
+            <a:fillRect/>
+          </a:stretch>
+        </p:blipFill>
         <p:spPr>
           <a:xfrm>
-            <a:off x="2281222" y="3214686"/>
-            <a:ext cx="6786578" cy="3033714"/>
+            <a:off x="1691680" y="2276872"/>
+            <a:ext cx="2592288" cy="2592288"/>
           </a:xfrm>
-          <a:solidFill>
-            <a:srgbClr val="FFFFFF">
-              <a:alpha val="80000"/>
-            </a:srgbClr>
-          </a:solidFill>
+          <a:prstGeom prst="rect">
+            <a:avLst/>
+          </a:prstGeom>
         </p:spPr>
-        <p:txBody>
-          <a:bodyPr rIns="288000">
-            <a:noAutofit/>
-          </a:bodyPr>
-          <a:lstStyle/>
-          <a:p>
-            <a:pPr marL="0" algn="r"/>
-            <a:r>
-              <a:rPr lang="pt-PT" sz="6000" dirty="0" smtClean="0"/>
-              <a:t>DATASET</a:t>
-            </a:r>
-            <a:endParaRPr lang="pt-PT" sz="6000" dirty="0"/>
-          </a:p>
-        </p:txBody>
-      </p:sp>
+      </p:pic>
+      <p:pic>
+        <p:nvPicPr>
+          <p:cNvPr id="5" name="Imagem 4"/>
+          <p:cNvPicPr>
+            <a:picLocks noChangeAspect="1"/>
+          </p:cNvPicPr>
+          <p:nvPr/>
+        </p:nvPicPr>
+        <p:blipFill>
+          <a:blip r:embed="rId4">
+            <a:extLst>
+              <a:ext uri="{28A0092B-C50C-407E-A947-70E740481C1C}">
+                <a14:useLocalDpi xmlns:a14="http://schemas.microsoft.com/office/drawing/2010/main" val="0"/>
+              </a:ext>
+            </a:extLst>
+          </a:blip>
+          <a:stretch>
+            <a:fillRect/>
+          </a:stretch>
+        </p:blipFill>
+        <p:spPr>
+          <a:xfrm>
+            <a:off x="5869454" y="851516"/>
+            <a:ext cx="3274546" cy="2274648"/>
+          </a:xfrm>
+          <a:prstGeom prst="rect">
+            <a:avLst/>
+          </a:prstGeom>
+        </p:spPr>
+      </p:pic>
     </p:spTree>
     <p:extLst>
       <p:ext uri="{BB962C8B-B14F-4D97-AF65-F5344CB8AC3E}">
-        <p14:creationId xmlns:p14="http://schemas.microsoft.com/office/powerpoint/2010/main" val="627357321"/>
+        <p14:creationId xmlns:p14="http://schemas.microsoft.com/office/powerpoint/2010/main" val="684448"/>
       </p:ext>
     </p:extLst>
   </p:cSld>
@@ -4472,7 +5165,7 @@
           <a:p>
             <a:r>
               <a:rPr lang="en-US" dirty="0" smtClean="0"/>
-              <a:t>Dataset</a:t>
+              <a:t>Domain</a:t>
             </a:r>
             <a:endParaRPr lang="pt-PT" dirty="0"/>
           </a:p>
@@ -4497,112 +5190,292 @@
           <a:p>
             <a:r>
               <a:rPr lang="en-US" sz="4000" dirty="0" smtClean="0"/>
-              <a:t>Dataset </a:t>
+              <a:t>High level </a:t>
             </a:r>
             <a:r>
               <a:rPr lang="en-US" sz="4000" dirty="0" smtClean="0"/>
               <a:t>description</a:t>
             </a:r>
-          </a:p>
-          <a:p>
-            <a:pPr lvl="1"/>
-            <a:r>
-              <a:rPr lang="en-US" dirty="0" smtClean="0"/>
-              <a:t>We have </a:t>
-            </a:r>
-            <a:r>
-              <a:rPr lang="en-US" b="1" dirty="0" smtClean="0"/>
-              <a:t>2</a:t>
-            </a:r>
-            <a:r>
-              <a:rPr lang="en-US" dirty="0" smtClean="0"/>
+            <a:endParaRPr lang="en-US" sz="4000" dirty="0" smtClean="0"/>
+          </a:p>
+        </p:txBody>
+      </p:sp>
+      <p:pic>
+        <p:nvPicPr>
+          <p:cNvPr id="4" name="Imagem 3"/>
+          <p:cNvPicPr>
+            <a:picLocks noChangeAspect="1"/>
+          </p:cNvPicPr>
+          <p:nvPr/>
+        </p:nvPicPr>
+        <p:blipFill>
+          <a:blip r:embed="rId3">
+            <a:extLst>
+              <a:ext uri="{28A0092B-C50C-407E-A947-70E740481C1C}">
+                <a14:useLocalDpi xmlns:a14="http://schemas.microsoft.com/office/drawing/2010/main" val="0"/>
+              </a:ext>
+            </a:extLst>
+          </a:blip>
+          <a:stretch>
+            <a:fillRect/>
+          </a:stretch>
+        </p:blipFill>
+        <p:spPr>
+          <a:xfrm>
+            <a:off x="1691680" y="2276872"/>
+            <a:ext cx="2592288" cy="2592288"/>
+          </a:xfrm>
+          <a:prstGeom prst="rect">
+            <a:avLst/>
+          </a:prstGeom>
+        </p:spPr>
+      </p:pic>
+      <p:pic>
+        <p:nvPicPr>
+          <p:cNvPr id="5" name="Imagem 4"/>
+          <p:cNvPicPr>
+            <a:picLocks noChangeAspect="1"/>
+          </p:cNvPicPr>
+          <p:nvPr/>
+        </p:nvPicPr>
+        <p:blipFill>
+          <a:blip r:embed="rId4">
+            <a:extLst>
+              <a:ext uri="{28A0092B-C50C-407E-A947-70E740481C1C}">
+                <a14:useLocalDpi xmlns:a14="http://schemas.microsoft.com/office/drawing/2010/main" val="0"/>
+              </a:ext>
+            </a:extLst>
+          </a:blip>
+          <a:stretch>
+            <a:fillRect/>
+          </a:stretch>
+        </p:blipFill>
+        <p:spPr>
+          <a:xfrm>
+            <a:off x="5869454" y="851516"/>
+            <a:ext cx="3274546" cy="2274648"/>
+          </a:xfrm>
+          <a:prstGeom prst="rect">
+            <a:avLst/>
+          </a:prstGeom>
+        </p:spPr>
+      </p:pic>
+      <p:sp>
+        <p:nvSpPr>
+          <p:cNvPr id="6" name="CaixaDeTexto 5"/>
+          <p:cNvSpPr txBox="1"/>
+          <p:nvPr/>
+        </p:nvSpPr>
+        <p:spPr>
+          <a:xfrm>
+            <a:off x="323528" y="4509120"/>
+            <a:ext cx="8136904" cy="1477328"/>
+          </a:xfrm>
+          <a:prstGeom prst="rect">
+            <a:avLst/>
+          </a:prstGeom>
+          <a:noFill/>
+        </p:spPr>
+        <p:txBody>
+          <a:bodyPr wrap="square" rtlCol="0">
+            <a:spAutoFit/>
+          </a:bodyPr>
+          <a:lstStyle/>
+          <a:p>
+            <a:pPr marL="285750" indent="-285750">
+              <a:buFont typeface="Arial" panose="020B0604020202020204" pitchFamily="34" charset="0"/>
+              <a:buChar char="•"/>
+            </a:pPr>
+            <a:r>
+              <a:rPr lang="pt-PT" sz="2400" dirty="0" err="1"/>
+              <a:t>Who</a:t>
+            </a:r>
+            <a:r>
+              <a:rPr lang="pt-PT" sz="2400" dirty="0"/>
               <a:t> </a:t>
             </a:r>
             <a:r>
-              <a:rPr lang="en-US" b="1" dirty="0" smtClean="0"/>
-              <a:t>dataset</a:t>
-            </a:r>
-            <a:r>
-              <a:rPr lang="en-US" dirty="0" smtClean="0"/>
-              <a:t>:</a:t>
-            </a:r>
-          </a:p>
-          <a:p>
-            <a:pPr lvl="1"/>
-            <a:r>
-              <a:rPr lang="en-US" dirty="0" smtClean="0"/>
+              <a:rPr lang="pt-PT" sz="2400" dirty="0" err="1"/>
+              <a:t>has</a:t>
+            </a:r>
+            <a:r>
+              <a:rPr lang="pt-PT" sz="2400" dirty="0"/>
               <a:t> </a:t>
             </a:r>
-          </a:p>
-          <a:p>
-            <a:pPr lvl="1"/>
-            <a:r>
-              <a:rPr lang="en-US" dirty="0" smtClean="0"/>
-              <a:t>One from an article in </a:t>
-            </a:r>
-            <a:r>
-              <a:rPr lang="en-US" b="1" i="1" dirty="0" smtClean="0"/>
-              <a:t>The Guardian</a:t>
-            </a:r>
-            <a:r>
-              <a:rPr lang="en-US" dirty="0" smtClean="0"/>
-              <a:t>,</a:t>
-            </a:r>
-          </a:p>
-          <a:p>
-            <a:pPr lvl="1"/>
-            <a:r>
-              <a:rPr lang="en-US" dirty="0" smtClean="0"/>
-              <a:t>   It has information about All </a:t>
-            </a:r>
-            <a:r>
-              <a:rPr lang="en-US" b="1" dirty="0" smtClean="0"/>
-              <a:t>podium winners</a:t>
-            </a:r>
-            <a:r>
-              <a:rPr lang="en-US" dirty="0" smtClean="0"/>
-              <a:t>, in every </a:t>
-            </a:r>
-            <a:r>
-              <a:rPr lang="en-US" b="1" dirty="0" smtClean="0"/>
-              <a:t>sport</a:t>
-            </a:r>
-            <a:r>
-              <a:rPr lang="en-US" dirty="0" smtClean="0"/>
-              <a:t>, since the first Edition of </a:t>
-            </a:r>
-            <a:r>
-              <a:rPr lang="en-US" dirty="0"/>
-              <a:t>the </a:t>
-            </a:r>
-            <a:r>
-              <a:rPr lang="en-US" b="1" dirty="0"/>
-              <a:t>Olympic </a:t>
-            </a:r>
-            <a:r>
-              <a:rPr lang="en-US" b="1"/>
-              <a:t>Games</a:t>
-            </a:r>
-            <a:r>
-              <a:rPr lang="en-US"/>
+            <a:r>
+              <a:rPr lang="pt-PT" sz="2400" dirty="0" err="1"/>
+              <a:t>the</a:t>
+            </a:r>
+            <a:r>
+              <a:rPr lang="pt-PT" sz="2400" dirty="0"/>
+              <a:t> more </a:t>
+            </a:r>
+            <a:r>
+              <a:rPr lang="pt-PT" sz="2400" dirty="0" err="1"/>
+              <a:t>gold</a:t>
+            </a:r>
+            <a:r>
+              <a:rPr lang="pt-PT" sz="2400" dirty="0"/>
               <a:t> </a:t>
             </a:r>
             <a:r>
-              <a:rPr lang="en-US" smtClean="0"/>
-              <a:t>in </a:t>
-            </a:r>
-            <a:r>
-              <a:rPr lang="en-US" dirty="0" smtClean="0"/>
-              <a:t>1896 until 2008.</a:t>
-            </a:r>
-            <a:endParaRPr lang="en-US" dirty="0" smtClean="0"/>
+              <a:rPr lang="pt-PT" sz="2400" dirty="0" err="1"/>
+              <a:t>medals</a:t>
+            </a:r>
+            <a:r>
+              <a:rPr lang="pt-PT" sz="2400" dirty="0"/>
+              <a:t> </a:t>
+            </a:r>
+            <a:r>
+              <a:rPr lang="pt-PT" sz="2400" dirty="0" err="1"/>
+              <a:t>of</a:t>
+            </a:r>
+            <a:r>
+              <a:rPr lang="pt-PT" sz="2400" dirty="0"/>
+              <a:t> </a:t>
+            </a:r>
+            <a:r>
+              <a:rPr lang="pt-PT" sz="2400" dirty="0" err="1"/>
+              <a:t>all</a:t>
+            </a:r>
+            <a:r>
+              <a:rPr lang="pt-PT" sz="2400" dirty="0"/>
+              <a:t> time?</a:t>
+            </a:r>
+          </a:p>
+          <a:p>
+            <a:pPr marL="285750" indent="-285750">
+              <a:buFont typeface="Arial" panose="020B0604020202020204" pitchFamily="34" charset="0"/>
+              <a:buChar char="•"/>
+            </a:pPr>
+            <a:r>
+              <a:rPr lang="pt-PT" sz="2400" dirty="0" err="1"/>
+              <a:t>Which</a:t>
+            </a:r>
+            <a:r>
+              <a:rPr lang="pt-PT" sz="2400" dirty="0"/>
+              <a:t> country </a:t>
+            </a:r>
+            <a:r>
+              <a:rPr lang="pt-PT" sz="2400" dirty="0" err="1"/>
+              <a:t>is</a:t>
+            </a:r>
+            <a:r>
+              <a:rPr lang="pt-PT" sz="2400" dirty="0"/>
+              <a:t> </a:t>
+            </a:r>
+            <a:r>
+              <a:rPr lang="pt-PT" sz="2400" dirty="0" err="1"/>
+              <a:t>been</a:t>
+            </a:r>
+            <a:r>
+              <a:rPr lang="pt-PT" sz="2400" dirty="0"/>
+              <a:t> </a:t>
+            </a:r>
+            <a:r>
+              <a:rPr lang="pt-PT" sz="2400" dirty="0" err="1"/>
+              <a:t>better</a:t>
+            </a:r>
+            <a:r>
+              <a:rPr lang="pt-PT" sz="2400" dirty="0"/>
+              <a:t> in </a:t>
+            </a:r>
+            <a:r>
+              <a:rPr lang="pt-PT" sz="2400" dirty="0" err="1"/>
+              <a:t>tennis</a:t>
+            </a:r>
+            <a:r>
+              <a:rPr lang="pt-PT" sz="2400" dirty="0"/>
+              <a:t> </a:t>
+            </a:r>
+            <a:r>
+              <a:rPr lang="pt-PT" sz="2400" dirty="0" err="1"/>
+              <a:t>since</a:t>
+            </a:r>
+            <a:r>
+              <a:rPr lang="pt-PT" sz="2400" dirty="0"/>
+              <a:t> </a:t>
+            </a:r>
+            <a:r>
+              <a:rPr lang="pt-PT" sz="2400" dirty="0" err="1"/>
+              <a:t>the</a:t>
+            </a:r>
+            <a:r>
+              <a:rPr lang="pt-PT" sz="2400" dirty="0"/>
+              <a:t> </a:t>
+            </a:r>
+            <a:r>
+              <a:rPr lang="pt-PT" sz="2400" dirty="0" err="1"/>
+              <a:t>year</a:t>
+            </a:r>
+            <a:r>
+              <a:rPr lang="pt-PT" sz="2400" dirty="0"/>
+              <a:t> 1896?</a:t>
+            </a:r>
+          </a:p>
+          <a:p>
+            <a:pPr marL="285750" indent="-285750">
+              <a:buFont typeface="Arial" panose="020B0604020202020204" pitchFamily="34" charset="0"/>
+              <a:buChar char="•"/>
+            </a:pPr>
+            <a:r>
+              <a:rPr lang="pt-PT" sz="2400" dirty="0" err="1"/>
+              <a:t>Which</a:t>
+            </a:r>
+            <a:r>
+              <a:rPr lang="pt-PT" sz="2400" dirty="0"/>
+              <a:t> country </a:t>
+            </a:r>
+            <a:r>
+              <a:rPr lang="pt-PT" sz="2400" dirty="0" err="1"/>
+              <a:t>had</a:t>
+            </a:r>
+            <a:r>
+              <a:rPr lang="pt-PT" sz="2400" dirty="0"/>
+              <a:t> </a:t>
+            </a:r>
+            <a:r>
+              <a:rPr lang="pt-PT" sz="2400" dirty="0" err="1"/>
+              <a:t>the</a:t>
+            </a:r>
+            <a:r>
+              <a:rPr lang="pt-PT" sz="2400" dirty="0"/>
+              <a:t> </a:t>
+            </a:r>
+            <a:r>
+              <a:rPr lang="pt-PT" sz="2400" dirty="0" err="1"/>
+              <a:t>best</a:t>
+            </a:r>
+            <a:r>
+              <a:rPr lang="pt-PT" sz="2400" dirty="0"/>
+              <a:t> </a:t>
+            </a:r>
+            <a:r>
+              <a:rPr lang="pt-PT" sz="2400" dirty="0" err="1"/>
+              <a:t>female</a:t>
+            </a:r>
+            <a:r>
+              <a:rPr lang="pt-PT" sz="2400" dirty="0"/>
+              <a:t> </a:t>
+            </a:r>
+            <a:r>
+              <a:rPr lang="pt-PT" sz="2400" dirty="0" err="1"/>
+              <a:t>athletes</a:t>
+            </a:r>
+            <a:r>
+              <a:rPr lang="pt-PT" sz="2400" dirty="0"/>
+              <a:t> in 2004?</a:t>
+            </a:r>
+          </a:p>
+          <a:p>
+            <a:endParaRPr lang="pt-PT" dirty="0"/>
           </a:p>
         </p:txBody>
       </p:sp>
     </p:spTree>
     <p:extLst>
       <p:ext uri="{BB962C8B-B14F-4D97-AF65-F5344CB8AC3E}">
-        <p14:creationId xmlns:p14="http://schemas.microsoft.com/office/powerpoint/2010/main" val="2962997025"/>
+        <p14:creationId xmlns:p14="http://schemas.microsoft.com/office/powerpoint/2010/main" val="1702024097"/>
       </p:ext>
     </p:extLst>
   </p:cSld>
@@ -4653,7 +5526,7 @@
           <a:p>
             <a:r>
               <a:rPr lang="en-US" dirty="0" smtClean="0"/>
-              <a:t>Dataset</a:t>
+              <a:t>Domain</a:t>
             </a:r>
             <a:endParaRPr lang="pt-PT" dirty="0"/>
           </a:p>
@@ -4678,87 +5551,344 @@
           <a:p>
             <a:r>
               <a:rPr lang="en-US" sz="4000" dirty="0" smtClean="0"/>
-              <a:t>Dataset </a:t>
+              <a:t>High level </a:t>
             </a:r>
             <a:r>
               <a:rPr lang="en-US" sz="4000" dirty="0" smtClean="0"/>
               <a:t>description</a:t>
             </a:r>
-          </a:p>
-          <a:p>
-            <a:pPr lvl="1"/>
-            <a:r>
-              <a:rPr lang="en-US" dirty="0" smtClean="0"/>
-              <a:t>We have </a:t>
-            </a:r>
-            <a:r>
-              <a:rPr lang="en-US" b="1" dirty="0" smtClean="0"/>
-              <a:t>2</a:t>
-            </a:r>
-            <a:r>
-              <a:rPr lang="en-US" dirty="0" smtClean="0"/>
+            <a:endParaRPr lang="en-US" sz="4000" dirty="0" smtClean="0"/>
+          </a:p>
+        </p:txBody>
+      </p:sp>
+      <p:pic>
+        <p:nvPicPr>
+          <p:cNvPr id="4" name="Imagem 3"/>
+          <p:cNvPicPr>
+            <a:picLocks noChangeAspect="1"/>
+          </p:cNvPicPr>
+          <p:nvPr/>
+        </p:nvPicPr>
+        <p:blipFill>
+          <a:blip r:embed="rId3">
+            <a:extLst>
+              <a:ext uri="{28A0092B-C50C-407E-A947-70E740481C1C}">
+                <a14:useLocalDpi xmlns:a14="http://schemas.microsoft.com/office/drawing/2010/main" val="0"/>
+              </a:ext>
+            </a:extLst>
+          </a:blip>
+          <a:stretch>
+            <a:fillRect/>
+          </a:stretch>
+        </p:blipFill>
+        <p:spPr>
+          <a:xfrm>
+            <a:off x="1691680" y="2276872"/>
+            <a:ext cx="2592288" cy="2592288"/>
+          </a:xfrm>
+          <a:prstGeom prst="rect">
+            <a:avLst/>
+          </a:prstGeom>
+        </p:spPr>
+      </p:pic>
+      <p:pic>
+        <p:nvPicPr>
+          <p:cNvPr id="5" name="Imagem 4"/>
+          <p:cNvPicPr>
+            <a:picLocks noChangeAspect="1"/>
+          </p:cNvPicPr>
+          <p:nvPr/>
+        </p:nvPicPr>
+        <p:blipFill>
+          <a:blip r:embed="rId4">
+            <a:extLst>
+              <a:ext uri="{28A0092B-C50C-407E-A947-70E740481C1C}">
+                <a14:useLocalDpi xmlns:a14="http://schemas.microsoft.com/office/drawing/2010/main" val="0"/>
+              </a:ext>
+            </a:extLst>
+          </a:blip>
+          <a:stretch>
+            <a:fillRect/>
+          </a:stretch>
+        </p:blipFill>
+        <p:spPr>
+          <a:xfrm>
+            <a:off x="5869454" y="851516"/>
+            <a:ext cx="3274546" cy="2274648"/>
+          </a:xfrm>
+          <a:prstGeom prst="rect">
+            <a:avLst/>
+          </a:prstGeom>
+        </p:spPr>
+      </p:pic>
+      <p:sp>
+        <p:nvSpPr>
+          <p:cNvPr id="6" name="CaixaDeTexto 5"/>
+          <p:cNvSpPr txBox="1"/>
+          <p:nvPr/>
+        </p:nvSpPr>
+        <p:spPr>
+          <a:xfrm>
+            <a:off x="323528" y="4509120"/>
+            <a:ext cx="8136904" cy="1477328"/>
+          </a:xfrm>
+          <a:prstGeom prst="rect">
+            <a:avLst/>
+          </a:prstGeom>
+          <a:noFill/>
+        </p:spPr>
+        <p:txBody>
+          <a:bodyPr wrap="square" rtlCol="0">
+            <a:spAutoFit/>
+          </a:bodyPr>
+          <a:lstStyle/>
+          <a:p>
+            <a:pPr marL="285750" indent="-285750">
+              <a:buFont typeface="Arial" panose="020B0604020202020204" pitchFamily="34" charset="0"/>
+              <a:buChar char="•"/>
+            </a:pPr>
+            <a:r>
+              <a:rPr lang="pt-PT" sz="2400" dirty="0" err="1" smtClean="0"/>
+              <a:t>Who</a:t>
+            </a:r>
+            <a:r>
+              <a:rPr lang="pt-PT" sz="2400" dirty="0" smtClean="0"/>
               <a:t> </a:t>
             </a:r>
             <a:r>
-              <a:rPr lang="en-US" b="1" dirty="0" smtClean="0"/>
-              <a:t>dataset</a:t>
-            </a:r>
-            <a:r>
-              <a:rPr lang="en-US" dirty="0" smtClean="0"/>
-              <a:t>:</a:t>
-            </a:r>
-          </a:p>
-          <a:p>
-            <a:pPr lvl="1"/>
-            <a:r>
-              <a:rPr lang="en-US" dirty="0" smtClean="0"/>
+              <a:rPr lang="pt-PT" sz="2400" dirty="0" err="1" smtClean="0"/>
+              <a:t>has</a:t>
+            </a:r>
+            <a:r>
+              <a:rPr lang="pt-PT" sz="2400" dirty="0" smtClean="0"/>
               <a:t> </a:t>
             </a:r>
-          </a:p>
-          <a:p>
-            <a:pPr lvl="1"/>
-            <a:r>
-              <a:rPr lang="en-US" dirty="0" smtClean="0"/>
-              <a:t>The other from </a:t>
-            </a:r>
-            <a:r>
-              <a:rPr lang="en-US" b="1" i="1" dirty="0" smtClean="0"/>
-              <a:t>The World Bank</a:t>
-            </a:r>
-            <a:r>
-              <a:rPr lang="en-US" dirty="0" smtClean="0"/>
-              <a:t>,</a:t>
-            </a:r>
-          </a:p>
-          <a:p>
-            <a:pPr lvl="1"/>
-            <a:r>
-              <a:rPr lang="en-US" dirty="0" smtClean="0"/>
-              <a:t>   It represents the </a:t>
-            </a:r>
-            <a:r>
-              <a:rPr lang="en-US" b="1" dirty="0" smtClean="0"/>
-              <a:t>population’s size</a:t>
-            </a:r>
-            <a:r>
-              <a:rPr lang="en-US" dirty="0" smtClean="0"/>
-              <a:t> of every </a:t>
-            </a:r>
-            <a:r>
-              <a:rPr lang="en-US" b="1" dirty="0" smtClean="0"/>
-              <a:t>country</a:t>
-            </a:r>
-            <a:r>
-              <a:rPr lang="en-US" dirty="0" smtClean="0"/>
-              <a:t> since 1960.</a:t>
-            </a:r>
+            <a:r>
+              <a:rPr lang="pt-PT" sz="2400" dirty="0" err="1" smtClean="0"/>
+              <a:t>the</a:t>
+            </a:r>
+            <a:r>
+              <a:rPr lang="pt-PT" sz="2400" dirty="0" smtClean="0"/>
+              <a:t> more </a:t>
+            </a:r>
+            <a:r>
+              <a:rPr lang="pt-PT" sz="2400" dirty="0" err="1" smtClean="0"/>
+              <a:t>gold</a:t>
+            </a:r>
+            <a:r>
+              <a:rPr lang="pt-PT" sz="2400" dirty="0" smtClean="0"/>
+              <a:t> </a:t>
+            </a:r>
+            <a:r>
+              <a:rPr lang="pt-PT" sz="2400" dirty="0" err="1" smtClean="0"/>
+              <a:t>medals</a:t>
+            </a:r>
+            <a:r>
+              <a:rPr lang="pt-PT" sz="2400" dirty="0" smtClean="0"/>
+              <a:t> </a:t>
+            </a:r>
+            <a:r>
+              <a:rPr lang="pt-PT" sz="2400" dirty="0" err="1" smtClean="0"/>
+              <a:t>of</a:t>
+            </a:r>
+            <a:r>
+              <a:rPr lang="pt-PT" sz="2400" dirty="0" smtClean="0"/>
+              <a:t> </a:t>
+            </a:r>
+            <a:r>
+              <a:rPr lang="pt-PT" sz="2400" dirty="0" err="1" smtClean="0"/>
+              <a:t>all</a:t>
+            </a:r>
+            <a:r>
+              <a:rPr lang="pt-PT" sz="2400" dirty="0" smtClean="0"/>
+              <a:t> time?</a:t>
+            </a:r>
+          </a:p>
+          <a:p>
+            <a:pPr marL="285750" indent="-285750">
+              <a:buFont typeface="Arial" panose="020B0604020202020204" pitchFamily="34" charset="0"/>
+              <a:buChar char="•"/>
+            </a:pPr>
+            <a:r>
+              <a:rPr lang="pt-PT" sz="2400" dirty="0" err="1" smtClean="0"/>
+              <a:t>Which</a:t>
+            </a:r>
+            <a:r>
+              <a:rPr lang="pt-PT" sz="2400" dirty="0" smtClean="0"/>
+              <a:t> country </a:t>
+            </a:r>
+            <a:r>
+              <a:rPr lang="pt-PT" sz="2400" dirty="0" err="1" smtClean="0"/>
+              <a:t>is</a:t>
+            </a:r>
+            <a:r>
+              <a:rPr lang="pt-PT" sz="2400" dirty="0" smtClean="0"/>
+              <a:t> </a:t>
+            </a:r>
+            <a:r>
+              <a:rPr lang="pt-PT" sz="2400" dirty="0" err="1" smtClean="0"/>
+              <a:t>been</a:t>
+            </a:r>
+            <a:r>
+              <a:rPr lang="pt-PT" sz="2400" dirty="0" smtClean="0"/>
+              <a:t> </a:t>
+            </a:r>
+            <a:r>
+              <a:rPr lang="pt-PT" sz="2400" dirty="0" err="1" smtClean="0"/>
+              <a:t>better</a:t>
+            </a:r>
+            <a:r>
+              <a:rPr lang="pt-PT" sz="2400" dirty="0" smtClean="0"/>
+              <a:t> in </a:t>
+            </a:r>
+            <a:r>
+              <a:rPr lang="pt-PT" sz="2400" dirty="0" err="1" smtClean="0"/>
+              <a:t>tennis</a:t>
+            </a:r>
+            <a:r>
+              <a:rPr lang="pt-PT" sz="2400" dirty="0" smtClean="0"/>
+              <a:t> </a:t>
+            </a:r>
+            <a:r>
+              <a:rPr lang="pt-PT" sz="2400" dirty="0" err="1" smtClean="0"/>
+              <a:t>since</a:t>
+            </a:r>
+            <a:r>
+              <a:rPr lang="pt-PT" sz="2400" dirty="0" smtClean="0"/>
+              <a:t> </a:t>
+            </a:r>
+            <a:r>
+              <a:rPr lang="pt-PT" sz="2400" dirty="0" err="1" smtClean="0"/>
+              <a:t>the</a:t>
+            </a:r>
+            <a:r>
+              <a:rPr lang="pt-PT" sz="2400" dirty="0" smtClean="0"/>
+              <a:t> </a:t>
+            </a:r>
+            <a:r>
+              <a:rPr lang="pt-PT" sz="2400" dirty="0" err="1" smtClean="0"/>
+              <a:t>year</a:t>
+            </a:r>
+            <a:r>
+              <a:rPr lang="pt-PT" sz="2400" dirty="0" smtClean="0"/>
+              <a:t> 1896?</a:t>
+            </a:r>
+          </a:p>
+          <a:p>
+            <a:pPr marL="285750" indent="-285750">
+              <a:buFont typeface="Arial" panose="020B0604020202020204" pitchFamily="34" charset="0"/>
+              <a:buChar char="•"/>
+            </a:pPr>
+            <a:r>
+              <a:rPr lang="pt-PT" sz="2400" dirty="0" err="1" smtClean="0"/>
+              <a:t>Which</a:t>
+            </a:r>
+            <a:r>
+              <a:rPr lang="pt-PT" sz="2400" dirty="0" smtClean="0"/>
+              <a:t> country </a:t>
+            </a:r>
+            <a:r>
+              <a:rPr lang="pt-PT" sz="2400" dirty="0" err="1" smtClean="0"/>
+              <a:t>had</a:t>
+            </a:r>
+            <a:r>
+              <a:rPr lang="pt-PT" sz="2400" dirty="0" smtClean="0"/>
+              <a:t> </a:t>
+            </a:r>
+            <a:r>
+              <a:rPr lang="pt-PT" sz="2400" dirty="0" err="1" smtClean="0"/>
+              <a:t>the</a:t>
+            </a:r>
+            <a:r>
+              <a:rPr lang="pt-PT" sz="2400" dirty="0" smtClean="0"/>
+              <a:t> </a:t>
+            </a:r>
+            <a:r>
+              <a:rPr lang="pt-PT" sz="2400" dirty="0" err="1" smtClean="0"/>
+              <a:t>best</a:t>
+            </a:r>
+            <a:r>
+              <a:rPr lang="pt-PT" sz="2400" dirty="0" smtClean="0"/>
+              <a:t> </a:t>
+            </a:r>
+            <a:r>
+              <a:rPr lang="pt-PT" sz="2400" dirty="0" err="1" smtClean="0"/>
+              <a:t>female</a:t>
+            </a:r>
+            <a:r>
+              <a:rPr lang="pt-PT" sz="2400" dirty="0" smtClean="0"/>
+              <a:t> </a:t>
+            </a:r>
+            <a:r>
+              <a:rPr lang="pt-PT" sz="2400" dirty="0" err="1" smtClean="0"/>
+              <a:t>athletes</a:t>
+            </a:r>
+            <a:r>
+              <a:rPr lang="pt-PT" sz="2400" dirty="0" smtClean="0"/>
+              <a:t> in 2004?</a:t>
+            </a:r>
+          </a:p>
+          <a:p>
+            <a:endParaRPr lang="pt-PT" dirty="0"/>
+          </a:p>
+        </p:txBody>
+      </p:sp>
+      <p:sp>
+        <p:nvSpPr>
+          <p:cNvPr id="7" name="CaixaDeTexto 6"/>
+          <p:cNvSpPr txBox="1"/>
+          <p:nvPr/>
+        </p:nvSpPr>
+        <p:spPr>
+          <a:xfrm>
+            <a:off x="5580112" y="5986448"/>
+            <a:ext cx="3096344" cy="707886"/>
+          </a:xfrm>
+          <a:prstGeom prst="rect">
+            <a:avLst/>
+          </a:prstGeom>
+          <a:noFill/>
+        </p:spPr>
+        <p:txBody>
+          <a:bodyPr wrap="square" rtlCol="0">
+            <a:spAutoFit/>
+          </a:bodyPr>
+          <a:lstStyle/>
+          <a:p>
+            <a:r>
+              <a:rPr lang="pt-PT" sz="4000" b="1" dirty="0" err="1" smtClean="0">
+                <a:solidFill>
+                  <a:schemeClr val="bg2">
+                    <a:lumMod val="75000"/>
+                  </a:schemeClr>
+                </a:solidFill>
+              </a:rPr>
+              <a:t>Statistics</a:t>
+            </a:r>
+            <a:r>
+              <a:rPr lang="pt-PT" sz="4000" b="1" dirty="0" smtClean="0">
+                <a:solidFill>
+                  <a:schemeClr val="bg2">
+                    <a:lumMod val="75000"/>
+                  </a:schemeClr>
+                </a:solidFill>
+              </a:rPr>
+              <a:t>…</a:t>
+            </a:r>
+            <a:endParaRPr lang="pt-PT" sz="4000" b="1" dirty="0">
+              <a:solidFill>
+                <a:schemeClr val="bg2">
+                  <a:lumMod val="75000"/>
+                </a:schemeClr>
+              </a:solidFill>
+            </a:endParaRPr>
           </a:p>
         </p:txBody>
       </p:sp>
     </p:spTree>
     <p:extLst>
       <p:ext uri="{BB962C8B-B14F-4D97-AF65-F5344CB8AC3E}">
-        <p14:creationId xmlns:p14="http://schemas.microsoft.com/office/powerpoint/2010/main" val="3260051677"/>
+        <p14:creationId xmlns:p14="http://schemas.microsoft.com/office/powerpoint/2010/main" val="2509903004"/>
       </p:ext>
     </p:extLst>
   </p:cSld>
@@ -4828,7 +5958,7 @@
           <a:p>
             <a:r>
               <a:rPr lang="pt-PT" sz="16600" dirty="0" smtClean="0"/>
-              <a:t>03</a:t>
+              <a:t>02</a:t>
             </a:r>
             <a:endParaRPr lang="pt-PT" sz="16600" dirty="0"/>
           </a:p>
@@ -4864,7 +5994,7 @@
             <a:pPr marL="0" algn="r"/>
             <a:r>
               <a:rPr lang="pt-PT" sz="6000" dirty="0" smtClean="0"/>
-              <a:t>TASKS</a:t>
+              <a:t>DATASET</a:t>
             </a:r>
             <a:endParaRPr lang="pt-PT" sz="6000" dirty="0"/>
           </a:p>
@@ -4873,7 +6003,7 @@
     </p:spTree>
     <p:extLst>
       <p:ext uri="{BB962C8B-B14F-4D97-AF65-F5344CB8AC3E}">
-        <p14:creationId xmlns:p14="http://schemas.microsoft.com/office/powerpoint/2010/main" val="760072998"/>
+        <p14:creationId xmlns:p14="http://schemas.microsoft.com/office/powerpoint/2010/main" val="627357321"/>
       </p:ext>
     </p:extLst>
   </p:cSld>
@@ -4924,7 +6054,7 @@
           <a:p>
             <a:r>
               <a:rPr lang="en-US" dirty="0" smtClean="0"/>
-              <a:t>Tasks</a:t>
+              <a:t>Dataset</a:t>
             </a:r>
             <a:endParaRPr lang="pt-PT" dirty="0"/>
           </a:p>
@@ -4940,12 +6070,7 @@
             <p:ph idx="1"/>
           </p:nvPr>
         </p:nvSpPr>
-        <p:spPr>
-          <a:xfrm>
-            <a:off x="457200" y="1094346"/>
-            <a:ext cx="8229600" cy="5214974"/>
-          </a:xfrm>
-        </p:spPr>
+        <p:spPr/>
         <p:txBody>
           <a:bodyPr>
             <a:noAutofit/>
@@ -4953,82 +6078,108 @@
           <a:lstStyle/>
           <a:p>
             <a:r>
-              <a:rPr lang="en-US" sz="3600" dirty="0" smtClean="0"/>
-              <a:t>Task 1</a:t>
+              <a:rPr lang="en-US" sz="4000" dirty="0" smtClean="0"/>
+              <a:t>Dataset description</a:t>
             </a:r>
           </a:p>
           <a:p>
             <a:pPr lvl="1"/>
             <a:r>
-              <a:rPr lang="en-US" sz="3200" dirty="0" smtClean="0"/>
-              <a:t>Type</a:t>
+              <a:rPr lang="en-US" dirty="0" smtClean="0"/>
+              <a:t>We have </a:t>
+            </a:r>
+            <a:r>
+              <a:rPr lang="en-US" b="1" dirty="0" smtClean="0"/>
+              <a:t>2</a:t>
+            </a:r>
+            <a:r>
+              <a:rPr lang="en-US" dirty="0" smtClean="0"/>
+              <a:t> </a:t>
+            </a:r>
+            <a:r>
+              <a:rPr lang="en-US" b="1" dirty="0" smtClean="0"/>
+              <a:t>dataset</a:t>
+            </a:r>
+            <a:r>
+              <a:rPr lang="en-US" dirty="0" smtClean="0"/>
+              <a:t>:</a:t>
             </a:r>
           </a:p>
           <a:p>
             <a:pPr lvl="1"/>
             <a:r>
-              <a:rPr lang="en-US" sz="3200" dirty="0" smtClean="0"/>
-              <a:t>Description</a:t>
-            </a:r>
-          </a:p>
-          <a:p>
-            <a:r>
-              <a:rPr lang="en-US" sz="3600" dirty="0"/>
-              <a:t>Task </a:t>
-            </a:r>
-            <a:r>
-              <a:rPr lang="en-US" sz="3600" dirty="0" smtClean="0"/>
-              <a:t>2</a:t>
-            </a:r>
-            <a:endParaRPr lang="en-US" sz="3600" dirty="0"/>
+              <a:rPr lang="en-US" dirty="0" smtClean="0"/>
+              <a:t> </a:t>
+            </a:r>
           </a:p>
           <a:p>
             <a:pPr lvl="1"/>
             <a:r>
-              <a:rPr lang="en-US" sz="3200" dirty="0"/>
-              <a:t>Type</a:t>
+              <a:rPr lang="en-US" dirty="0" smtClean="0"/>
+              <a:t>One from an article in </a:t>
+            </a:r>
+            <a:r>
+              <a:rPr lang="en-US" b="1" i="1" dirty="0" smtClean="0"/>
+              <a:t>The Guardian</a:t>
+            </a:r>
+            <a:r>
+              <a:rPr lang="en-US" dirty="0" smtClean="0"/>
+              <a:t>,</a:t>
             </a:r>
           </a:p>
           <a:p>
             <a:pPr lvl="1"/>
             <a:r>
-              <a:rPr lang="en-US" sz="3200" dirty="0"/>
-              <a:t>Description</a:t>
-            </a:r>
-            <a:endParaRPr lang="en-US" sz="2400" dirty="0"/>
-          </a:p>
-          <a:p>
-            <a:r>
-              <a:rPr lang="en-US" sz="3600" dirty="0"/>
-              <a:t>Task </a:t>
-            </a:r>
-            <a:r>
-              <a:rPr lang="en-US" sz="3600" dirty="0" smtClean="0"/>
-              <a:t>3</a:t>
-            </a:r>
-            <a:endParaRPr lang="en-US" sz="3600" dirty="0"/>
-          </a:p>
-          <a:p>
-            <a:pPr lvl="1"/>
-            <a:r>
-              <a:rPr lang="en-US" sz="3200" dirty="0"/>
-              <a:t>Type</a:t>
-            </a:r>
-          </a:p>
-          <a:p>
-            <a:pPr lvl="1"/>
-            <a:r>
-              <a:rPr lang="en-US" sz="3200" dirty="0" smtClean="0"/>
-              <a:t>Description</a:t>
-            </a:r>
-            <a:endParaRPr lang="en-US" sz="2400" dirty="0"/>
+              <a:rPr lang="en-US" dirty="0" smtClean="0"/>
+              <a:t>   It has information about All </a:t>
+            </a:r>
+            <a:r>
+              <a:rPr lang="en-US" b="1" dirty="0" smtClean="0"/>
+              <a:t>podium winners</a:t>
+            </a:r>
+            <a:r>
+              <a:rPr lang="en-US" dirty="0" smtClean="0"/>
+              <a:t>, in every </a:t>
+            </a:r>
+            <a:r>
+              <a:rPr lang="en-US" b="1" dirty="0" smtClean="0"/>
+              <a:t>sport</a:t>
+            </a:r>
+            <a:r>
+              <a:rPr lang="en-US" dirty="0" smtClean="0"/>
+              <a:t>, since the first Edition of </a:t>
+            </a:r>
+            <a:r>
+              <a:rPr lang="en-US" dirty="0"/>
+              <a:t>the </a:t>
+            </a:r>
+            <a:r>
+              <a:rPr lang="en-US" b="1" dirty="0"/>
+              <a:t>Olympic </a:t>
+            </a:r>
+            <a:r>
+              <a:rPr lang="en-US" b="1"/>
+              <a:t>Games</a:t>
+            </a:r>
+            <a:r>
+              <a:rPr lang="en-US"/>
+              <a:t> </a:t>
+            </a:r>
+            <a:r>
+              <a:rPr lang="en-US" smtClean="0"/>
+              <a:t>in </a:t>
+            </a:r>
+            <a:r>
+              <a:rPr lang="en-US" dirty="0" smtClean="0"/>
+              <a:t>1896 until 2008.</a:t>
+            </a:r>
           </a:p>
         </p:txBody>
       </p:sp>
     </p:spTree>
     <p:extLst>
       <p:ext uri="{BB962C8B-B14F-4D97-AF65-F5344CB8AC3E}">
-        <p14:creationId xmlns:p14="http://schemas.microsoft.com/office/powerpoint/2010/main" val="1967416131"/>
+        <p14:creationId xmlns:p14="http://schemas.microsoft.com/office/powerpoint/2010/main" val="2962997025"/>
       </p:ext>
     </p:extLst>
   </p:cSld>
@@ -5064,12 +6215,12 @@
       </p:grpSpPr>
       <p:sp>
         <p:nvSpPr>
-          <p:cNvPr id="6" name="Text Placeholder 5"/>
-          <p:cNvSpPr>
-            <a:spLocks noGrp="1"/>
-          </p:cNvSpPr>
-          <p:nvPr>
-            <p:ph type="body" sz="quarter" idx="11"/>
+          <p:cNvPr id="2" name="Title 1"/>
+          <p:cNvSpPr>
+            <a:spLocks noGrp="1"/>
+          </p:cNvSpPr>
+          <p:nvPr>
+            <p:ph type="title"/>
           </p:nvPr>
         </p:nvSpPr>
         <p:spPr/>
@@ -5077,77 +6228,110 @@
           <a:bodyPr/>
           <a:lstStyle/>
           <a:p>
-            <a:endParaRPr lang="en-US" dirty="0"/>
-          </a:p>
-        </p:txBody>
-      </p:sp>
-      <p:sp>
-        <p:nvSpPr>
-          <p:cNvPr id="29" name="Text Placeholder 28"/>
-          <p:cNvSpPr>
-            <a:spLocks noGrp="1"/>
-          </p:cNvSpPr>
-          <p:nvPr>
-            <p:ph type="body" sz="quarter" idx="10"/>
+            <a:r>
+              <a:rPr lang="en-US" dirty="0" smtClean="0"/>
+              <a:t>Dataset</a:t>
+            </a:r>
+            <a:endParaRPr lang="pt-PT" dirty="0"/>
+          </a:p>
+        </p:txBody>
+      </p:sp>
+      <p:sp>
+        <p:nvSpPr>
+          <p:cNvPr id="3" name="Content Placeholder 2"/>
+          <p:cNvSpPr>
+            <a:spLocks noGrp="1"/>
+          </p:cNvSpPr>
+          <p:nvPr>
+            <p:ph idx="1"/>
           </p:nvPr>
         </p:nvSpPr>
         <p:spPr/>
         <p:txBody>
-          <a:bodyPr/>
-          <a:lstStyle/>
-          <a:p>
-            <a:r>
-              <a:rPr lang="pt-PT" sz="16600" dirty="0" smtClean="0"/>
-              <a:t>04</a:t>
-            </a:r>
-            <a:endParaRPr lang="pt-PT" sz="16600" dirty="0"/>
-          </a:p>
-        </p:txBody>
-      </p:sp>
-      <p:sp>
-        <p:nvSpPr>
-          <p:cNvPr id="4" name="Title 3"/>
-          <p:cNvSpPr>
-            <a:spLocks noGrp="1"/>
-          </p:cNvSpPr>
-          <p:nvPr>
-            <p:ph type="title"/>
-          </p:nvPr>
-        </p:nvSpPr>
-        <p:spPr>
-          <a:xfrm>
-            <a:off x="2281222" y="3214686"/>
-            <a:ext cx="6786578" cy="3033714"/>
-          </a:xfrm>
-          <a:solidFill>
-            <a:srgbClr val="FFFFFF">
-              <a:alpha val="80000"/>
-            </a:srgbClr>
-          </a:solidFill>
-        </p:spPr>
-        <p:txBody>
-          <a:bodyPr rIns="288000">
+          <a:bodyPr>
             <a:noAutofit/>
           </a:bodyPr>
           <a:lstStyle/>
           <a:p>
-            <a:pPr marL="0" algn="r"/>
-            <a:r>
-              <a:rPr lang="pt-PT" sz="6000" dirty="0" err="1" smtClean="0"/>
-              <a:t>Example</a:t>
-            </a:r>
-            <a:r>
-              <a:rPr lang="pt-PT" sz="6000" dirty="0" smtClean="0"/>
-              <a:t> QUESTIONS</a:t>
-            </a:r>
-            <a:endParaRPr lang="pt-PT" sz="6000" dirty="0"/>
+            <a:r>
+              <a:rPr lang="en-US" sz="4000" dirty="0" smtClean="0"/>
+              <a:t>Dataset description</a:t>
+            </a:r>
+          </a:p>
+          <a:p>
+            <a:pPr lvl="1"/>
+            <a:r>
+              <a:rPr lang="en-US" dirty="0" smtClean="0"/>
+              <a:t>We have </a:t>
+            </a:r>
+            <a:r>
+              <a:rPr lang="en-US" b="1" dirty="0" smtClean="0"/>
+              <a:t>2</a:t>
+            </a:r>
+            <a:r>
+              <a:rPr lang="en-US" dirty="0" smtClean="0"/>
+              <a:t> </a:t>
+            </a:r>
+            <a:r>
+              <a:rPr lang="en-US" b="1" dirty="0" smtClean="0"/>
+              <a:t>dataset</a:t>
+            </a:r>
+            <a:r>
+              <a:rPr lang="en-US" dirty="0" smtClean="0"/>
+              <a:t>:</a:t>
+            </a:r>
+          </a:p>
+          <a:p>
+            <a:pPr lvl="1"/>
+            <a:r>
+              <a:rPr lang="en-US" dirty="0" smtClean="0"/>
+              <a:t> </a:t>
+            </a:r>
+          </a:p>
+          <a:p>
+            <a:pPr lvl="1"/>
+            <a:r>
+              <a:rPr lang="en-US" dirty="0" smtClean="0"/>
+              <a:t>The other from </a:t>
+            </a:r>
+            <a:r>
+              <a:rPr lang="en-US" b="1" i="1" dirty="0" smtClean="0"/>
+              <a:t>The World Bank</a:t>
+            </a:r>
+            <a:r>
+              <a:rPr lang="en-US" dirty="0" smtClean="0"/>
+              <a:t>,</a:t>
+            </a:r>
+          </a:p>
+          <a:p>
+            <a:pPr lvl="1"/>
+            <a:r>
+              <a:rPr lang="en-US" dirty="0" smtClean="0"/>
+              <a:t>   It represents the </a:t>
+            </a:r>
+            <a:r>
+              <a:rPr lang="en-US" b="1" dirty="0" smtClean="0"/>
+              <a:t>population’s size</a:t>
+            </a:r>
+            <a:r>
+              <a:rPr lang="en-US" dirty="0" smtClean="0"/>
+              <a:t> of every </a:t>
+            </a:r>
+            <a:r>
+              <a:rPr lang="en-US" b="1" dirty="0" smtClean="0"/>
+              <a:t>country</a:t>
+            </a:r>
+            <a:r>
+              <a:rPr lang="en-US" dirty="0" smtClean="0"/>
+              <a:t> since 1960.</a:t>
+            </a:r>
           </a:p>
         </p:txBody>
       </p:sp>
     </p:spTree>
     <p:extLst>
       <p:ext uri="{BB962C8B-B14F-4D97-AF65-F5344CB8AC3E}">
-        <p14:creationId xmlns:p14="http://schemas.microsoft.com/office/powerpoint/2010/main" val="4045494449"/>
+        <p14:creationId xmlns:p14="http://schemas.microsoft.com/office/powerpoint/2010/main" val="3260051677"/>
       </p:ext>
     </p:extLst>
   </p:cSld>

</xml_diff>

<commit_message>
Correcção que achei que precisava
</commit_message>
<xml_diff>
--- a/Lab03-PresentationTemplate.pptx
+++ b/Lab03-PresentationTemplate.pptx
@@ -5,10 +5,10 @@
     <p:sldMasterId id="2147483648" r:id="rId1"/>
   </p:sldMasterIdLst>
   <p:notesMasterIdLst>
-    <p:notesMasterId r:id="rId17"/>
+    <p:notesMasterId r:id="rId18"/>
   </p:notesMasterIdLst>
   <p:handoutMasterIdLst>
-    <p:handoutMasterId r:id="rId18"/>
+    <p:handoutMasterId r:id="rId19"/>
   </p:handoutMasterIdLst>
   <p:sldIdLst>
     <p:sldId id="256" r:id="rId2"/>
@@ -22,10 +22,11 @@
     <p:sldId id="1105" r:id="rId10"/>
     <p:sldId id="1099" r:id="rId11"/>
     <p:sldId id="1100" r:id="rId12"/>
-    <p:sldId id="1101" r:id="rId13"/>
-    <p:sldId id="1102" r:id="rId14"/>
-    <p:sldId id="1103" r:id="rId15"/>
-    <p:sldId id="1104" r:id="rId16"/>
+    <p:sldId id="1111" r:id="rId13"/>
+    <p:sldId id="1101" r:id="rId14"/>
+    <p:sldId id="1102" r:id="rId15"/>
+    <p:sldId id="1103" r:id="rId16"/>
+    <p:sldId id="1104" r:id="rId17"/>
   </p:sldIdLst>
   <p:sldSz cx="9144000" cy="6858000" type="screen4x3"/>
   <p:notesSz cx="6858000" cy="9144000"/>
@@ -126,7 +127,7 @@
   </p:defaultTextStyle>
   <p:extLst>
     <p:ext uri="{EFAFB233-063F-42B5-8137-9DF3F51BA10A}">
-      <p15:sldGuideLst xmlns="" xmlns:p15="http://schemas.microsoft.com/office/powerpoint/2012/main">
+      <p15:sldGuideLst xmlns:p15="http://schemas.microsoft.com/office/powerpoint/2012/main" xmlns="">
         <p15:guide id="1" orient="horz" pos="2160">
           <p15:clr>
             <a:srgbClr val="A4A3A4"/>
@@ -225,7 +226,7 @@
           <a:p>
             <a:fld id="{745C36E7-9E00-462E-80A3-32F2BE615C7A}" type="datetimeFigureOut">
               <a:rPr lang="en-US" smtClean="0"/>
-              <a:t>10/3/2015</a:t>
+              <a:t>03-Oct-15</a:t>
             </a:fld>
             <a:endParaRPr lang="en-US"/>
           </a:p>
@@ -291,7 +292,7 @@
           <a:p>
             <a:fld id="{C7B702CB-D988-47C5-8204-95032A6A7C26}" type="slidenum">
               <a:rPr lang="en-US" smtClean="0"/>
-              <a:t>‹nº›</a:t>
+              <a:t>‹#›</a:t>
             </a:fld>
             <a:endParaRPr lang="en-US"/>
           </a:p>
@@ -391,7 +392,7 @@
             <a:fld id="{01F3E309-ED8D-4193-99AF-E5EA90965E98}" type="datetimeFigureOut">
               <a:rPr lang="en-US" smtClean="0"/>
               <a:pPr/>
-              <a:t>10/3/2015</a:t>
+              <a:t>03-Oct-15</a:t>
             </a:fld>
             <a:endParaRPr lang="en-US"/>
           </a:p>
@@ -553,7 +554,7 @@
             <a:fld id="{F535F173-C1DD-4975-94BF-5B9ED67F7674}" type="slidenum">
               <a:rPr lang="en-US" smtClean="0"/>
               <a:pPr/>
-              <a:t>‹nº›</a:t>
+              <a:t>‹#›</a:t>
             </a:fld>
             <a:endParaRPr lang="en-US"/>
           </a:p>
@@ -747,6 +748,91 @@
 </p:notes>
 </file>
 
+<file path=ppt/notesSlides/notesSlide10.xml><?xml version="1.0" encoding="utf-8"?>
+<p:notes xmlns:a="http://schemas.openxmlformats.org/drawingml/2006/main" xmlns:r="http://schemas.openxmlformats.org/officeDocument/2006/relationships" xmlns:p="http://schemas.openxmlformats.org/presentationml/2006/main">
+  <p:cSld>
+    <p:spTree>
+      <p:nvGrpSpPr>
+        <p:cNvPr id="1" name=""/>
+        <p:cNvGrpSpPr/>
+        <p:nvPr/>
+      </p:nvGrpSpPr>
+      <p:grpSpPr>
+        <a:xfrm>
+          <a:off x="0" y="0"/>
+          <a:ext cx="0" cy="0"/>
+          <a:chOff x="0" y="0"/>
+          <a:chExt cx="0" cy="0"/>
+        </a:xfrm>
+      </p:grpSpPr>
+      <p:sp>
+        <p:nvSpPr>
+          <p:cNvPr id="2" name="Slide Image Placeholder 1"/>
+          <p:cNvSpPr>
+            <a:spLocks noGrp="1" noRot="1" noChangeAspect="1"/>
+          </p:cNvSpPr>
+          <p:nvPr>
+            <p:ph type="sldImg"/>
+          </p:nvPr>
+        </p:nvSpPr>
+        <p:spPr/>
+      </p:sp>
+      <p:sp>
+        <p:nvSpPr>
+          <p:cNvPr id="3" name="Notes Placeholder 2"/>
+          <p:cNvSpPr>
+            <a:spLocks noGrp="1"/>
+          </p:cNvSpPr>
+          <p:nvPr>
+            <p:ph type="body" idx="1"/>
+          </p:nvPr>
+        </p:nvSpPr>
+        <p:spPr/>
+        <p:txBody>
+          <a:bodyPr/>
+          <a:lstStyle/>
+          <a:p>
+            <a:endParaRPr lang="en-US" baseline="0" dirty="0" smtClean="0"/>
+          </a:p>
+        </p:txBody>
+      </p:sp>
+      <p:sp>
+        <p:nvSpPr>
+          <p:cNvPr id="4" name="Slide Number Placeholder 3"/>
+          <p:cNvSpPr>
+            <a:spLocks noGrp="1"/>
+          </p:cNvSpPr>
+          <p:nvPr>
+            <p:ph type="sldNum" sz="quarter" idx="10"/>
+          </p:nvPr>
+        </p:nvSpPr>
+        <p:spPr/>
+        <p:txBody>
+          <a:bodyPr/>
+          <a:lstStyle/>
+          <a:p>
+            <a:fld id="{F535F173-C1DD-4975-94BF-5B9ED67F7674}" type="slidenum">
+              <a:rPr lang="en-US" smtClean="0"/>
+              <a:pPr/>
+              <a:t>16</a:t>
+            </a:fld>
+            <a:endParaRPr lang="en-US"/>
+          </a:p>
+        </p:txBody>
+      </p:sp>
+    </p:spTree>
+    <p:extLst>
+      <p:ext uri="{BB962C8B-B14F-4D97-AF65-F5344CB8AC3E}">
+        <p14:creationId xmlns:p14="http://schemas.microsoft.com/office/powerpoint/2010/main" val="35205596"/>
+      </p:ext>
+    </p:extLst>
+  </p:cSld>
+  <p:clrMapOvr>
+    <a:masterClrMapping/>
+  </p:clrMapOvr>
+</p:notes>
+</file>
+
 <file path=ppt/notesSlides/notesSlide2.xml><?xml version="1.0" encoding="utf-8"?>
 <p:notes xmlns:a="http://schemas.openxmlformats.org/drawingml/2006/main" xmlns:r="http://schemas.openxmlformats.org/officeDocument/2006/relationships" xmlns:p="http://schemas.openxmlformats.org/presentationml/2006/main">
   <p:cSld>
@@ -1323,7 +1409,7 @@
             <a:fld id="{F535F173-C1DD-4975-94BF-5B9ED67F7674}" type="slidenum">
               <a:rPr lang="en-US" smtClean="0"/>
               <a:pPr/>
-              <a:t>13</a:t>
+              <a:t>12</a:t>
             </a:fld>
             <a:endParaRPr lang="en-US"/>
           </a:p>
@@ -1408,7 +1494,7 @@
             <a:fld id="{F535F173-C1DD-4975-94BF-5B9ED67F7674}" type="slidenum">
               <a:rPr lang="en-US" smtClean="0"/>
               <a:pPr/>
-              <a:t>15</a:t>
+              <a:t>14</a:t>
             </a:fld>
             <a:endParaRPr lang="en-US"/>
           </a:p>
@@ -1417,7 +1503,7 @@
     </p:spTree>
     <p:extLst>
       <p:ext uri="{BB962C8B-B14F-4D97-AF65-F5344CB8AC3E}">
-        <p14:creationId xmlns:p14="http://schemas.microsoft.com/office/powerpoint/2010/main" val="35205596"/>
+        <p14:creationId xmlns:p14="http://schemas.microsoft.com/office/powerpoint/2010/main" val="1355792998"/>
       </p:ext>
     </p:extLst>
   </p:cSld>
@@ -1919,7 +2005,7 @@
             <a:fld id="{F3CC9924-33BC-4796-B0F9-D37DB5D899BF}" type="datetimeFigureOut">
               <a:rPr lang="pt-PT" smtClean="0"/>
               <a:pPr/>
-              <a:t>03/10/2015</a:t>
+              <a:t>03-10-2015</a:t>
             </a:fld>
             <a:endParaRPr lang="pt-PT"/>
           </a:p>
@@ -1978,7 +2064,7 @@
             <a:fld id="{B5EBF8D4-C87A-47B7-9996-84452461937B}" type="slidenum">
               <a:rPr lang="pt-PT" smtClean="0"/>
               <a:pPr/>
-              <a:t>‹nº›</a:t>
+              <a:t>‹#›</a:t>
             </a:fld>
             <a:endParaRPr lang="pt-PT"/>
           </a:p>
@@ -4126,13 +4212,8 @@
           <a:p>
             <a:r>
               <a:rPr lang="en-US" sz="3600" dirty="0" smtClean="0"/>
-              <a:t>Task </a:t>
-            </a:r>
-            <a:r>
-              <a:rPr lang="en-US" sz="3600" dirty="0" smtClean="0"/>
-              <a:t>1 – Browse</a:t>
-            </a:r>
-            <a:endParaRPr lang="en-US" sz="3600" dirty="0" smtClean="0"/>
+              <a:t>Task 1 – Browse</a:t>
+            </a:r>
           </a:p>
           <a:p>
             <a:pPr lvl="1"/>
@@ -4140,7 +4221,6 @@
               <a:rPr lang="en-US" sz="3200" dirty="0" smtClean="0"/>
               <a:t>“Show a list of the countries with the most gold medalists, in total, in a given year”</a:t>
             </a:r>
-            <a:endParaRPr lang="en-US" sz="3200" dirty="0" smtClean="0"/>
           </a:p>
           <a:p>
             <a:r>
@@ -4184,11 +4264,7 @@
             <a:pPr lvl="1"/>
             <a:r>
               <a:rPr lang="en-US" sz="3200" dirty="0" smtClean="0"/>
-              <a:t>“Show the position of the country in th</a:t>
-            </a:r>
-            <a:r>
-              <a:rPr lang="en-US" sz="3200" dirty="0" smtClean="0"/>
-              <a:t>e overall standings”</a:t>
+              <a:t>“Show the position of the country in the overall standings”</a:t>
             </a:r>
             <a:endParaRPr lang="en-US" sz="2400" dirty="0"/>
           </a:p>
@@ -4233,12 +4309,12 @@
       </p:grpSpPr>
       <p:sp>
         <p:nvSpPr>
-          <p:cNvPr id="6" name="Text Placeholder 5"/>
-          <p:cNvSpPr>
-            <a:spLocks noGrp="1"/>
-          </p:cNvSpPr>
-          <p:nvPr>
-            <p:ph type="body" sz="quarter" idx="11"/>
+          <p:cNvPr id="2" name="Title 1"/>
+          <p:cNvSpPr>
+            <a:spLocks noGrp="1"/>
+          </p:cNvSpPr>
+          <p:nvPr>
+            <p:ph type="title"/>
           </p:nvPr>
         </p:nvSpPr>
         <p:spPr/>
@@ -4246,77 +4322,131 @@
           <a:bodyPr/>
           <a:lstStyle/>
           <a:p>
-            <a:endParaRPr lang="en-US" dirty="0"/>
-          </a:p>
-        </p:txBody>
-      </p:sp>
-      <p:sp>
-        <p:nvSpPr>
-          <p:cNvPr id="29" name="Text Placeholder 28"/>
-          <p:cNvSpPr>
-            <a:spLocks noGrp="1"/>
-          </p:cNvSpPr>
-          <p:nvPr>
-            <p:ph type="body" sz="quarter" idx="10"/>
-          </p:nvPr>
-        </p:nvSpPr>
-        <p:spPr/>
-        <p:txBody>
-          <a:bodyPr/>
-          <a:lstStyle/>
-          <a:p>
-            <a:r>
-              <a:rPr lang="pt-PT" sz="16600" dirty="0" smtClean="0"/>
-              <a:t>04</a:t>
-            </a:r>
-            <a:endParaRPr lang="pt-PT" sz="16600" dirty="0"/>
-          </a:p>
-        </p:txBody>
-      </p:sp>
-      <p:sp>
-        <p:nvSpPr>
-          <p:cNvPr id="4" name="Title 3"/>
-          <p:cNvSpPr>
-            <a:spLocks noGrp="1"/>
-          </p:cNvSpPr>
-          <p:nvPr>
-            <p:ph type="title"/>
+            <a:r>
+              <a:rPr lang="en-US" dirty="0" smtClean="0"/>
+              <a:t>Tasks</a:t>
+            </a:r>
+            <a:endParaRPr lang="pt-PT" dirty="0"/>
+          </a:p>
+        </p:txBody>
+      </p:sp>
+      <p:sp>
+        <p:nvSpPr>
+          <p:cNvPr id="3" name="Content Placeholder 2"/>
+          <p:cNvSpPr>
+            <a:spLocks noGrp="1"/>
+          </p:cNvSpPr>
+          <p:nvPr>
+            <p:ph idx="1"/>
           </p:nvPr>
         </p:nvSpPr>
         <p:spPr>
           <a:xfrm>
-            <a:off x="2281222" y="3214686"/>
-            <a:ext cx="6786578" cy="3033714"/>
+            <a:off x="457200" y="1094346"/>
+            <a:ext cx="8229600" cy="5214974"/>
           </a:xfrm>
-          <a:solidFill>
-            <a:srgbClr val="FFFFFF">
-              <a:alpha val="80000"/>
-            </a:srgbClr>
-          </a:solidFill>
         </p:spPr>
         <p:txBody>
-          <a:bodyPr rIns="288000">
+          <a:bodyPr>
             <a:noAutofit/>
           </a:bodyPr>
           <a:lstStyle/>
           <a:p>
-            <a:pPr marL="0" algn="r"/>
-            <a:r>
-              <a:rPr lang="pt-PT" sz="6000" dirty="0" err="1" smtClean="0"/>
-              <a:t>Example</a:t>
-            </a:r>
-            <a:r>
-              <a:rPr lang="pt-PT" sz="6000" dirty="0" smtClean="0"/>
-              <a:t> QUESTIONS</a:t>
-            </a:r>
-            <a:endParaRPr lang="pt-PT" sz="6000" dirty="0"/>
+            <a:r>
+              <a:rPr lang="en-GB" sz="3600" dirty="0" smtClean="0"/>
+              <a:t>Task 4 </a:t>
+            </a:r>
+            <a:r>
+              <a:rPr lang="en-GB" sz="3600" dirty="0"/>
+              <a:t>-</a:t>
+            </a:r>
+            <a:r>
+              <a:rPr lang="en-GB" sz="3600" dirty="0" smtClean="0"/>
+              <a:t> Explore</a:t>
+            </a:r>
+            <a:endParaRPr lang="en-US" sz="3600" dirty="0"/>
+          </a:p>
+          <a:p>
+            <a:pPr lvl="1"/>
+            <a:r>
+              <a:rPr lang="en-US" sz="3200" dirty="0" smtClean="0"/>
+              <a:t>“</a:t>
+            </a:r>
+            <a:r>
+              <a:rPr lang="en-GB" sz="3200" dirty="0" smtClean="0"/>
+              <a:t>Using </a:t>
+            </a:r>
+            <a:r>
+              <a:rPr lang="en-GB" sz="3200" dirty="0"/>
+              <a:t>the derivative variable </a:t>
+            </a:r>
+            <a:r>
+              <a:rPr lang="en-GB" sz="3200" dirty="0" err="1"/>
+              <a:t>nºmedallists</a:t>
+            </a:r>
+            <a:r>
+              <a:rPr lang="en-GB" sz="3200" dirty="0"/>
+              <a:t>/</a:t>
+            </a:r>
+            <a:r>
+              <a:rPr lang="en-GB" sz="3200" dirty="0" err="1"/>
+              <a:t>nºpopulation</a:t>
+            </a:r>
+            <a:r>
+              <a:rPr lang="en-GB" sz="3200" dirty="0"/>
+              <a:t>, show the list of countries with the highest coefficient</a:t>
+            </a:r>
+            <a:r>
+              <a:rPr lang="en-US" sz="3200" dirty="0" smtClean="0"/>
+              <a:t>”</a:t>
+            </a:r>
+            <a:endParaRPr lang="en-US" sz="2400" dirty="0"/>
+          </a:p>
+          <a:p>
+            <a:r>
+              <a:rPr lang="en-US" sz="3600" dirty="0"/>
+              <a:t>Task </a:t>
+            </a:r>
+            <a:r>
+              <a:rPr lang="en-US" sz="3600" dirty="0" smtClean="0"/>
+              <a:t>5 </a:t>
+            </a:r>
+            <a:r>
+              <a:rPr lang="en-US" sz="3600" dirty="0" smtClean="0"/>
+              <a:t>- </a:t>
+            </a:r>
+            <a:r>
+              <a:rPr lang="en-US" sz="3600" dirty="0" smtClean="0"/>
+              <a:t>Compare</a:t>
+            </a:r>
+            <a:endParaRPr lang="en-US" sz="3200" dirty="0"/>
+          </a:p>
+          <a:p>
+            <a:pPr lvl="1"/>
+            <a:r>
+              <a:rPr lang="en-US" sz="3200" dirty="0" smtClean="0"/>
+              <a:t>“</a:t>
+            </a:r>
+            <a:r>
+              <a:rPr lang="en-GB" sz="3200" dirty="0" smtClean="0"/>
+              <a:t>Show </a:t>
+            </a:r>
+            <a:r>
+              <a:rPr lang="en-GB" sz="3200" dirty="0"/>
+              <a:t>the medals each country won</a:t>
+            </a:r>
+            <a:r>
+              <a:rPr lang="en-US" sz="3200" dirty="0" smtClean="0"/>
+              <a:t>”</a:t>
+            </a:r>
+            <a:endParaRPr lang="en-US" sz="2400" dirty="0"/>
           </a:p>
         </p:txBody>
       </p:sp>
     </p:spTree>
     <p:extLst>
       <p:ext uri="{BB962C8B-B14F-4D97-AF65-F5344CB8AC3E}">
-        <p14:creationId xmlns:p14="http://schemas.microsoft.com/office/powerpoint/2010/main" val="4045494449"/>
+        <p14:creationId xmlns:p14="http://schemas.microsoft.com/office/powerpoint/2010/main" val="413679773"/>
       </p:ext>
     </p:extLst>
   </p:cSld>
@@ -4352,97 +4482,90 @@
       </p:grpSpPr>
       <p:sp>
         <p:nvSpPr>
-          <p:cNvPr id="2" name="Title 1"/>
+          <p:cNvPr id="6" name="Text Placeholder 5"/>
+          <p:cNvSpPr>
+            <a:spLocks noGrp="1"/>
+          </p:cNvSpPr>
+          <p:nvPr>
+            <p:ph type="body" sz="quarter" idx="11"/>
+          </p:nvPr>
+        </p:nvSpPr>
+        <p:spPr/>
+        <p:txBody>
+          <a:bodyPr/>
+          <a:lstStyle/>
+          <a:p>
+            <a:endParaRPr lang="en-US" dirty="0"/>
+          </a:p>
+        </p:txBody>
+      </p:sp>
+      <p:sp>
+        <p:nvSpPr>
+          <p:cNvPr id="29" name="Text Placeholder 28"/>
+          <p:cNvSpPr>
+            <a:spLocks noGrp="1"/>
+          </p:cNvSpPr>
+          <p:nvPr>
+            <p:ph type="body" sz="quarter" idx="10"/>
+          </p:nvPr>
+        </p:nvSpPr>
+        <p:spPr/>
+        <p:txBody>
+          <a:bodyPr/>
+          <a:lstStyle/>
+          <a:p>
+            <a:r>
+              <a:rPr lang="pt-PT" sz="16600" dirty="0" smtClean="0"/>
+              <a:t>04</a:t>
+            </a:r>
+            <a:endParaRPr lang="pt-PT" sz="16600" dirty="0"/>
+          </a:p>
+        </p:txBody>
+      </p:sp>
+      <p:sp>
+        <p:nvSpPr>
+          <p:cNvPr id="4" name="Title 3"/>
           <p:cNvSpPr>
             <a:spLocks noGrp="1"/>
           </p:cNvSpPr>
           <p:nvPr>
             <p:ph type="title"/>
-          </p:nvPr>
-        </p:nvSpPr>
-        <p:spPr/>
-        <p:txBody>
-          <a:bodyPr/>
-          <a:lstStyle/>
-          <a:p>
-            <a:r>
-              <a:rPr lang="en-US" dirty="0" smtClean="0"/>
-              <a:t>Questions</a:t>
-            </a:r>
-            <a:endParaRPr lang="pt-PT" dirty="0"/>
-          </a:p>
-        </p:txBody>
-      </p:sp>
-      <p:sp>
-        <p:nvSpPr>
-          <p:cNvPr id="3" name="Content Placeholder 2"/>
-          <p:cNvSpPr>
-            <a:spLocks noGrp="1"/>
-          </p:cNvSpPr>
-          <p:nvPr>
-            <p:ph idx="1"/>
           </p:nvPr>
         </p:nvSpPr>
         <p:spPr>
           <a:xfrm>
-            <a:off x="457200" y="1094346"/>
-            <a:ext cx="8229600" cy="5214974"/>
+            <a:off x="2281222" y="3214686"/>
+            <a:ext cx="6786578" cy="3033714"/>
           </a:xfrm>
+          <a:solidFill>
+            <a:srgbClr val="FFFFFF">
+              <a:alpha val="80000"/>
+            </a:srgbClr>
+          </a:solidFill>
         </p:spPr>
         <p:txBody>
-          <a:bodyPr>
+          <a:bodyPr rIns="288000">
             <a:noAutofit/>
           </a:bodyPr>
           <a:lstStyle/>
           <a:p>
-            <a:r>
-              <a:rPr lang="en-US" sz="4000" dirty="0" smtClean="0"/>
-              <a:t>Question 1</a:t>
-            </a:r>
-          </a:p>
-          <a:p>
-            <a:r>
-              <a:rPr lang="en-US" sz="4000" dirty="0" smtClean="0"/>
-              <a:t>Question 2</a:t>
-            </a:r>
-            <a:endParaRPr lang="en-US" sz="4000" dirty="0"/>
-          </a:p>
-          <a:p>
-            <a:r>
-              <a:rPr lang="en-US" sz="4000" dirty="0" smtClean="0"/>
-              <a:t>Question 3</a:t>
-            </a:r>
-          </a:p>
-          <a:p>
-            <a:r>
-              <a:rPr lang="en-US" sz="4000" dirty="0"/>
-              <a:t>Question 4</a:t>
-            </a:r>
-            <a:endParaRPr lang="en-US" sz="4000" dirty="0" smtClean="0"/>
-          </a:p>
-          <a:p>
-            <a:r>
-              <a:rPr lang="en-US" sz="4000" dirty="0"/>
-              <a:t>Question </a:t>
-            </a:r>
-            <a:r>
-              <a:rPr lang="en-US" sz="4000" dirty="0" smtClean="0"/>
-              <a:t>5</a:t>
-            </a:r>
-            <a:endParaRPr lang="en-US" sz="4000" dirty="0"/>
-          </a:p>
-          <a:p>
-            <a:endParaRPr lang="en-US" sz="4000" dirty="0" smtClean="0"/>
-          </a:p>
-          <a:p>
-            <a:endParaRPr lang="en-US" sz="4000" dirty="0"/>
+            <a:pPr marL="0" algn="r"/>
+            <a:r>
+              <a:rPr lang="pt-PT" sz="6000" dirty="0" err="1" smtClean="0"/>
+              <a:t>Example</a:t>
+            </a:r>
+            <a:r>
+              <a:rPr lang="pt-PT" sz="6000" dirty="0" smtClean="0"/>
+              <a:t> QUESTIONS</a:t>
+            </a:r>
+            <a:endParaRPr lang="pt-PT" sz="6000" dirty="0"/>
           </a:p>
         </p:txBody>
       </p:sp>
     </p:spTree>
     <p:extLst>
       <p:ext uri="{BB962C8B-B14F-4D97-AF65-F5344CB8AC3E}">
-        <p14:creationId xmlns:p14="http://schemas.microsoft.com/office/powerpoint/2010/main" val="3456915046"/>
+        <p14:creationId xmlns:p14="http://schemas.microsoft.com/office/powerpoint/2010/main" val="4045494449"/>
       </p:ext>
     </p:extLst>
   </p:cSld>
@@ -4478,6 +4601,132 @@
       </p:grpSpPr>
       <p:sp>
         <p:nvSpPr>
+          <p:cNvPr id="2" name="Title 1"/>
+          <p:cNvSpPr>
+            <a:spLocks noGrp="1"/>
+          </p:cNvSpPr>
+          <p:nvPr>
+            <p:ph type="title"/>
+          </p:nvPr>
+        </p:nvSpPr>
+        <p:spPr/>
+        <p:txBody>
+          <a:bodyPr/>
+          <a:lstStyle/>
+          <a:p>
+            <a:r>
+              <a:rPr lang="en-US" dirty="0" smtClean="0"/>
+              <a:t>Questions</a:t>
+            </a:r>
+            <a:endParaRPr lang="pt-PT" dirty="0"/>
+          </a:p>
+        </p:txBody>
+      </p:sp>
+      <p:sp>
+        <p:nvSpPr>
+          <p:cNvPr id="3" name="Content Placeholder 2"/>
+          <p:cNvSpPr>
+            <a:spLocks noGrp="1"/>
+          </p:cNvSpPr>
+          <p:nvPr>
+            <p:ph idx="1"/>
+          </p:nvPr>
+        </p:nvSpPr>
+        <p:spPr>
+          <a:xfrm>
+            <a:off x="457200" y="1094346"/>
+            <a:ext cx="8229600" cy="5214974"/>
+          </a:xfrm>
+        </p:spPr>
+        <p:txBody>
+          <a:bodyPr>
+            <a:noAutofit/>
+          </a:bodyPr>
+          <a:lstStyle/>
+          <a:p>
+            <a:r>
+              <a:rPr lang="en-US" sz="4000" dirty="0" smtClean="0"/>
+              <a:t>Question 1</a:t>
+            </a:r>
+          </a:p>
+          <a:p>
+            <a:r>
+              <a:rPr lang="en-US" sz="4000" dirty="0" smtClean="0"/>
+              <a:t>Question 2</a:t>
+            </a:r>
+            <a:endParaRPr lang="en-US" sz="4000" dirty="0"/>
+          </a:p>
+          <a:p>
+            <a:r>
+              <a:rPr lang="en-US" sz="4000" dirty="0" smtClean="0"/>
+              <a:t>Question 3</a:t>
+            </a:r>
+          </a:p>
+          <a:p>
+            <a:r>
+              <a:rPr lang="en-US" sz="4000" dirty="0"/>
+              <a:t>Question 4</a:t>
+            </a:r>
+            <a:endParaRPr lang="en-US" sz="4000" dirty="0" smtClean="0"/>
+          </a:p>
+          <a:p>
+            <a:r>
+              <a:rPr lang="en-US" sz="4000" dirty="0"/>
+              <a:t>Question </a:t>
+            </a:r>
+            <a:r>
+              <a:rPr lang="en-US" sz="4000" dirty="0" smtClean="0"/>
+              <a:t>5</a:t>
+            </a:r>
+            <a:endParaRPr lang="en-US" sz="4000" dirty="0"/>
+          </a:p>
+          <a:p>
+            <a:endParaRPr lang="en-US" sz="4000" dirty="0" smtClean="0"/>
+          </a:p>
+          <a:p>
+            <a:endParaRPr lang="en-US" sz="4000" dirty="0"/>
+          </a:p>
+        </p:txBody>
+      </p:sp>
+    </p:spTree>
+    <p:extLst>
+      <p:ext uri="{BB962C8B-B14F-4D97-AF65-F5344CB8AC3E}">
+        <p14:creationId xmlns:p14="http://schemas.microsoft.com/office/powerpoint/2010/main" val="3456915046"/>
+      </p:ext>
+    </p:extLst>
+  </p:cSld>
+  <p:clrMapOvr>
+    <a:masterClrMapping/>
+  </p:clrMapOvr>
+  <p:timing>
+    <p:tnLst>
+      <p:par>
+        <p:cTn id="1" dur="indefinite" restart="never" nodeType="tmRoot"/>
+      </p:par>
+    </p:tnLst>
+  </p:timing>
+</p:sld>
+</file>
+
+<file path=ppt/slides/slide15.xml><?xml version="1.0" encoding="utf-8"?>
+<p:sld xmlns:a="http://schemas.openxmlformats.org/drawingml/2006/main" xmlns:r="http://schemas.openxmlformats.org/officeDocument/2006/relationships" xmlns:p="http://schemas.openxmlformats.org/presentationml/2006/main">
+  <p:cSld>
+    <p:spTree>
+      <p:nvGrpSpPr>
+        <p:cNvPr id="1" name=""/>
+        <p:cNvGrpSpPr/>
+        <p:nvPr/>
+      </p:nvGrpSpPr>
+      <p:grpSpPr>
+        <a:xfrm>
+          <a:off x="0" y="0"/>
+          <a:ext cx="0" cy="0"/>
+          <a:chOff x="0" y="0"/>
+          <a:chExt cx="0" cy="0"/>
+        </a:xfrm>
+      </p:grpSpPr>
+      <p:sp>
+        <p:nvSpPr>
           <p:cNvPr id="6" name="Text Placeholder 5"/>
           <p:cNvSpPr>
             <a:spLocks noGrp="1"/>
@@ -4574,7 +4823,7 @@
 </p:sld>
 </file>
 
-<file path=ppt/slides/slide15.xml><?xml version="1.0" encoding="utf-8"?>
+<file path=ppt/slides/slide16.xml><?xml version="1.0" encoding="utf-8"?>
 <p:sld xmlns:a="http://schemas.openxmlformats.org/drawingml/2006/main" xmlns:r="http://schemas.openxmlformats.org/officeDocument/2006/relationships" xmlns:p="http://schemas.openxmlformats.org/presentationml/2006/main">
   <p:cSld>
     <p:spTree>
@@ -4922,13 +5171,8 @@
           <a:p>
             <a:r>
               <a:rPr lang="en-US" sz="4000" dirty="0" smtClean="0"/>
-              <a:t>High level </a:t>
-            </a:r>
-            <a:r>
-              <a:rPr lang="en-US" sz="4000" dirty="0" smtClean="0"/>
-              <a:t>description</a:t>
-            </a:r>
-            <a:endParaRPr lang="en-US" sz="4000" dirty="0" smtClean="0"/>
+              <a:t>High level description</a:t>
+            </a:r>
           </a:p>
         </p:txBody>
       </p:sp>
@@ -5041,13 +5285,8 @@
           <a:p>
             <a:r>
               <a:rPr lang="en-US" sz="4000" dirty="0" smtClean="0"/>
-              <a:t>High level </a:t>
-            </a:r>
-            <a:r>
-              <a:rPr lang="en-US" sz="4000" dirty="0" smtClean="0"/>
-              <a:t>description</a:t>
-            </a:r>
-            <a:endParaRPr lang="en-US" sz="4000" dirty="0" smtClean="0"/>
+              <a:t>High level description</a:t>
+            </a:r>
           </a:p>
         </p:txBody>
       </p:sp>
@@ -5190,13 +5429,8 @@
           <a:p>
             <a:r>
               <a:rPr lang="en-US" sz="4000" dirty="0" smtClean="0"/>
-              <a:t>High level </a:t>
-            </a:r>
-            <a:r>
-              <a:rPr lang="en-US" sz="4000" dirty="0" smtClean="0"/>
-              <a:t>description</a:t>
-            </a:r>
-            <a:endParaRPr lang="en-US" sz="4000" dirty="0" smtClean="0"/>
+              <a:t>High level description</a:t>
+            </a:r>
           </a:p>
         </p:txBody>
       </p:sp>
@@ -5287,60 +5521,16 @@
               <a:buChar char="•"/>
             </a:pPr>
             <a:r>
-              <a:rPr lang="pt-PT" sz="2400" dirty="0" err="1"/>
-              <a:t>Who</a:t>
-            </a:r>
-            <a:r>
               <a:rPr lang="pt-PT" sz="2400" dirty="0"/>
-              <a:t> </a:t>
-            </a:r>
-            <a:r>
-              <a:rPr lang="pt-PT" sz="2400" dirty="0" err="1"/>
-              <a:t>has</a:t>
+              <a:t>Who has the </a:t>
+            </a:r>
+            <a:r>
+              <a:rPr lang="pt-PT" sz="2400" dirty="0" smtClean="0"/>
+              <a:t>most </a:t>
             </a:r>
             <a:r>
               <a:rPr lang="pt-PT" sz="2400" dirty="0"/>
-              <a:t> </a:t>
-            </a:r>
-            <a:r>
-              <a:rPr lang="pt-PT" sz="2400" dirty="0" err="1"/>
-              <a:t>the</a:t>
-            </a:r>
-            <a:r>
-              <a:rPr lang="pt-PT" sz="2400" dirty="0"/>
-              <a:t> more </a:t>
-            </a:r>
-            <a:r>
-              <a:rPr lang="pt-PT" sz="2400" dirty="0" err="1"/>
-              <a:t>gold</a:t>
-            </a:r>
-            <a:r>
-              <a:rPr lang="pt-PT" sz="2400" dirty="0"/>
-              <a:t> </a:t>
-            </a:r>
-            <a:r>
-              <a:rPr lang="pt-PT" sz="2400" dirty="0" err="1"/>
-              <a:t>medals</a:t>
-            </a:r>
-            <a:r>
-              <a:rPr lang="pt-PT" sz="2400" dirty="0"/>
-              <a:t> </a:t>
-            </a:r>
-            <a:r>
-              <a:rPr lang="pt-PT" sz="2400" dirty="0" err="1"/>
-              <a:t>of</a:t>
-            </a:r>
-            <a:r>
-              <a:rPr lang="pt-PT" sz="2400" dirty="0"/>
-              <a:t> </a:t>
-            </a:r>
-            <a:r>
-              <a:rPr lang="pt-PT" sz="2400" dirty="0" err="1"/>
-              <a:t>all</a:t>
-            </a:r>
-            <a:r>
-              <a:rPr lang="pt-PT" sz="2400" dirty="0"/>
-              <a:t> time?</a:t>
+              <a:t>gold medals of all time?</a:t>
             </a:r>
           </a:p>
           <a:p>
@@ -5349,68 +5539,20 @@
               <a:buChar char="•"/>
             </a:pPr>
             <a:r>
-              <a:rPr lang="pt-PT" sz="2400" dirty="0" err="1"/>
-              <a:t>Which</a:t>
-            </a:r>
-            <a:r>
               <a:rPr lang="pt-PT" sz="2400" dirty="0"/>
-              <a:t> country </a:t>
-            </a:r>
-            <a:r>
-              <a:rPr lang="pt-PT" sz="2400" dirty="0" err="1"/>
-              <a:t>is</a:t>
+              <a:t>Which country </a:t>
+            </a:r>
+            <a:r>
+              <a:rPr lang="pt-PT" sz="2400" dirty="0" smtClean="0"/>
+              <a:t>has</a:t>
+            </a:r>
+            <a:r>
+              <a:rPr lang="pt-PT" sz="2400" dirty="0" smtClean="0"/>
+              <a:t> </a:t>
             </a:r>
             <a:r>
               <a:rPr lang="pt-PT" sz="2400" dirty="0"/>
-              <a:t> </a:t>
-            </a:r>
-            <a:r>
-              <a:rPr lang="pt-PT" sz="2400" dirty="0" err="1"/>
-              <a:t>been</a:t>
-            </a:r>
-            <a:r>
-              <a:rPr lang="pt-PT" sz="2400" dirty="0"/>
-              <a:t> </a:t>
-            </a:r>
-            <a:r>
-              <a:rPr lang="pt-PT" sz="2400" dirty="0" err="1"/>
-              <a:t>better</a:t>
-            </a:r>
-            <a:r>
-              <a:rPr lang="pt-PT" sz="2400" dirty="0"/>
-              <a:t> in </a:t>
-            </a:r>
-            <a:r>
-              <a:rPr lang="pt-PT" sz="2400" dirty="0" err="1"/>
-              <a:t>tennis</a:t>
-            </a:r>
-            <a:r>
-              <a:rPr lang="pt-PT" sz="2400" dirty="0"/>
-              <a:t> </a:t>
-            </a:r>
-            <a:r>
-              <a:rPr lang="pt-PT" sz="2400" dirty="0" err="1"/>
-              <a:t>since</a:t>
-            </a:r>
-            <a:r>
-              <a:rPr lang="pt-PT" sz="2400" dirty="0"/>
-              <a:t> </a:t>
-            </a:r>
-            <a:r>
-              <a:rPr lang="pt-PT" sz="2400" dirty="0" err="1"/>
-              <a:t>the</a:t>
-            </a:r>
-            <a:r>
-              <a:rPr lang="pt-PT" sz="2400" dirty="0"/>
-              <a:t> </a:t>
-            </a:r>
-            <a:r>
-              <a:rPr lang="pt-PT" sz="2400" dirty="0" err="1"/>
-              <a:t>year</a:t>
-            </a:r>
-            <a:r>
-              <a:rPr lang="pt-PT" sz="2400" dirty="0"/>
-              <a:t> 1896?</a:t>
+              <a:t>been better in tennis since the year 1896?</a:t>
             </a:r>
           </a:p>
           <a:p>
@@ -5551,13 +5693,8 @@
           <a:p>
             <a:r>
               <a:rPr lang="en-US" sz="4000" dirty="0" smtClean="0"/>
-              <a:t>High level </a:t>
-            </a:r>
-            <a:r>
-              <a:rPr lang="en-US" sz="4000" dirty="0" smtClean="0"/>
-              <a:t>description</a:t>
-            </a:r>
-            <a:endParaRPr lang="en-US" sz="4000" dirty="0" smtClean="0"/>
+              <a:t>High level description</a:t>
+            </a:r>
           </a:p>
         </p:txBody>
       </p:sp>
@@ -5648,60 +5785,16 @@
               <a:buChar char="•"/>
             </a:pPr>
             <a:r>
-              <a:rPr lang="pt-PT" sz="2400" dirty="0" err="1" smtClean="0"/>
-              <a:t>Who</a:t>
-            </a:r>
-            <a:r>
               <a:rPr lang="pt-PT" sz="2400" dirty="0" smtClean="0"/>
-              <a:t> </a:t>
-            </a:r>
-            <a:r>
-              <a:rPr lang="pt-PT" sz="2400" dirty="0" err="1" smtClean="0"/>
-              <a:t>has</a:t>
+              <a:t>Who has the </a:t>
             </a:r>
             <a:r>
               <a:rPr lang="pt-PT" sz="2400" dirty="0" smtClean="0"/>
-              <a:t> </a:t>
-            </a:r>
-            <a:r>
-              <a:rPr lang="pt-PT" sz="2400" dirty="0" err="1" smtClean="0"/>
-              <a:t>the</a:t>
+              <a:t>most </a:t>
             </a:r>
             <a:r>
               <a:rPr lang="pt-PT" sz="2400" dirty="0" smtClean="0"/>
-              <a:t> more </a:t>
-            </a:r>
-            <a:r>
-              <a:rPr lang="pt-PT" sz="2400" dirty="0" err="1" smtClean="0"/>
-              <a:t>gold</a:t>
-            </a:r>
-            <a:r>
-              <a:rPr lang="pt-PT" sz="2400" dirty="0" smtClean="0"/>
-              <a:t> </a:t>
-            </a:r>
-            <a:r>
-              <a:rPr lang="pt-PT" sz="2400" dirty="0" err="1" smtClean="0"/>
-              <a:t>medals</a:t>
-            </a:r>
-            <a:r>
-              <a:rPr lang="pt-PT" sz="2400" dirty="0" smtClean="0"/>
-              <a:t> </a:t>
-            </a:r>
-            <a:r>
-              <a:rPr lang="pt-PT" sz="2400" dirty="0" err="1" smtClean="0"/>
-              <a:t>of</a:t>
-            </a:r>
-            <a:r>
-              <a:rPr lang="pt-PT" sz="2400" dirty="0" smtClean="0"/>
-              <a:t> </a:t>
-            </a:r>
-            <a:r>
-              <a:rPr lang="pt-PT" sz="2400" dirty="0" err="1" smtClean="0"/>
-              <a:t>all</a:t>
-            </a:r>
-            <a:r>
-              <a:rPr lang="pt-PT" sz="2400" dirty="0" smtClean="0"/>
-              <a:t> time?</a:t>
+              <a:t>gold medals of all time?</a:t>
             </a:r>
           </a:p>
           <a:p>
@@ -5710,68 +5803,20 @@
               <a:buChar char="•"/>
             </a:pPr>
             <a:r>
-              <a:rPr lang="pt-PT" sz="2400" dirty="0" err="1" smtClean="0"/>
-              <a:t>Which</a:t>
-            </a:r>
-            <a:r>
               <a:rPr lang="pt-PT" sz="2400" dirty="0" smtClean="0"/>
-              <a:t> country </a:t>
-            </a:r>
-            <a:r>
-              <a:rPr lang="pt-PT" sz="2400" dirty="0" err="1" smtClean="0"/>
-              <a:t>is</a:t>
+              <a:t>Which country </a:t>
+            </a:r>
+            <a:r>
+              <a:rPr lang="pt-PT" sz="2400" dirty="0" smtClean="0"/>
+              <a:t>has</a:t>
             </a:r>
             <a:r>
               <a:rPr lang="pt-PT" sz="2400" dirty="0" smtClean="0"/>
               <a:t> </a:t>
             </a:r>
             <a:r>
-              <a:rPr lang="pt-PT" sz="2400" dirty="0" err="1" smtClean="0"/>
-              <a:t>been</a:t>
-            </a:r>
-            <a:r>
               <a:rPr lang="pt-PT" sz="2400" dirty="0" smtClean="0"/>
-              <a:t> </a:t>
-            </a:r>
-            <a:r>
-              <a:rPr lang="pt-PT" sz="2400" dirty="0" err="1" smtClean="0"/>
-              <a:t>better</a:t>
-            </a:r>
-            <a:r>
-              <a:rPr lang="pt-PT" sz="2400" dirty="0" smtClean="0"/>
-              <a:t> in </a:t>
-            </a:r>
-            <a:r>
-              <a:rPr lang="pt-PT" sz="2400" dirty="0" err="1" smtClean="0"/>
-              <a:t>tennis</a:t>
-            </a:r>
-            <a:r>
-              <a:rPr lang="pt-PT" sz="2400" dirty="0" smtClean="0"/>
-              <a:t> </a:t>
-            </a:r>
-            <a:r>
-              <a:rPr lang="pt-PT" sz="2400" dirty="0" err="1" smtClean="0"/>
-              <a:t>since</a:t>
-            </a:r>
-            <a:r>
-              <a:rPr lang="pt-PT" sz="2400" dirty="0" smtClean="0"/>
-              <a:t> </a:t>
-            </a:r>
-            <a:r>
-              <a:rPr lang="pt-PT" sz="2400" dirty="0" err="1" smtClean="0"/>
-              <a:t>the</a:t>
-            </a:r>
-            <a:r>
-              <a:rPr lang="pt-PT" sz="2400" dirty="0" smtClean="0"/>
-              <a:t> </a:t>
-            </a:r>
-            <a:r>
-              <a:rPr lang="pt-PT" sz="2400" dirty="0" err="1" smtClean="0"/>
-              <a:t>year</a:t>
-            </a:r>
-            <a:r>
-              <a:rPr lang="pt-PT" sz="2400" dirty="0" smtClean="0"/>
-              <a:t> 1896?</a:t>
+              <a:t>been better in tennis since the year 1896?</a:t>
             </a:r>
           </a:p>
           <a:p>
@@ -6098,12 +6143,13 @@
             </a:r>
             <a:r>
               <a:rPr lang="en-US" b="1" dirty="0" smtClean="0"/>
-              <a:t>dataset</a:t>
+              <a:t>datasets</a:t>
             </a:r>
             <a:r>
               <a:rPr lang="en-US" dirty="0" smtClean="0"/>
               <a:t>:</a:t>
             </a:r>
+            <a:endParaRPr lang="en-US" dirty="0" smtClean="0"/>
           </a:p>
           <a:p>
             <a:pPr lvl="1"/>
@@ -6155,23 +6201,15 @@
             </a:r>
             <a:r>
               <a:rPr lang="en-US" b="1" dirty="0"/>
-              <a:t>Olympic </a:t>
-            </a:r>
-            <a:r>
-              <a:rPr lang="en-US" b="1"/>
-              <a:t>Games</a:t>
-            </a:r>
-            <a:r>
-              <a:rPr lang="en-US"/>
+              <a:t>Olympic Games</a:t>
+            </a:r>
+            <a:r>
+              <a:rPr lang="en-US" dirty="0"/>
               <a:t> </a:t>
             </a:r>
             <a:r>
-              <a:rPr lang="en-US" smtClean="0"/>
-              <a:t>in </a:t>
-            </a:r>
-            <a:r>
               <a:rPr lang="en-US" dirty="0" smtClean="0"/>
-              <a:t>1896 until 2008.</a:t>
+              <a:t>in 1896 until 2008.</a:t>
             </a:r>
           </a:p>
         </p:txBody>

</xml_diff>